<commit_message>
Updated presentation with suggested changes, and detailed geometric diagram!
</commit_message>
<xml_diff>
--- a/Presentation/Pres.pptx
+++ b/Presentation/Pres.pptx
@@ -9,13 +9,13 @@
     <p:sldId id="258" r:id="rId3"/>
     <p:sldId id="257" r:id="rId4"/>
     <p:sldId id="259" r:id="rId5"/>
-    <p:sldId id="260" r:id="rId6"/>
+    <p:sldId id="269" r:id="rId6"/>
     <p:sldId id="266" r:id="rId7"/>
     <p:sldId id="261" r:id="rId8"/>
-    <p:sldId id="264" r:id="rId9"/>
-    <p:sldId id="262" r:id="rId10"/>
-    <p:sldId id="265" r:id="rId11"/>
-    <p:sldId id="263" r:id="rId12"/>
+    <p:sldId id="262" r:id="rId9"/>
+    <p:sldId id="265" r:id="rId10"/>
+    <p:sldId id="263" r:id="rId11"/>
+    <p:sldId id="267" r:id="rId12"/>
   </p:sldIdLst>
   <p:sldSz cx="12192000" cy="6858000"/>
   <p:notesSz cx="6858000" cy="9144000"/>
@@ -164,10 +164,9 @@
           </a:lstStyle>
           <a:p>
             <a:r>
-              <a:rPr lang="en-US" smtClean="0"/>
+              <a:rPr lang="en-US"/>
               <a:t>Click to edit Master title style</a:t>
             </a:r>
-            <a:endParaRPr lang="en-US"/>
           </a:p>
         </p:txBody>
       </p:sp>
@@ -229,10 +228,9 @@
           </a:lstStyle>
           <a:p>
             <a:r>
-              <a:rPr lang="en-US" smtClean="0"/>
+              <a:rPr lang="en-US"/>
               <a:t>Click to edit Master subtitle style</a:t>
             </a:r>
-            <a:endParaRPr lang="en-US"/>
           </a:p>
         </p:txBody>
       </p:sp>
@@ -253,7 +251,7 @@
           <a:p>
             <a:fld id="{8D1E8DE6-3E2F-4801-92CD-87E53721B098}" type="datetimeFigureOut">
               <a:rPr lang="en-US" smtClean="0"/>
-              <a:t>10-Oct-18</a:t>
+              <a:t>10/10/2018</a:t>
             </a:fld>
             <a:endParaRPr lang="en-US"/>
           </a:p>
@@ -311,13 +309,6 @@
   <p:clrMapOvr>
     <a:masterClrMapping/>
   </p:clrMapOvr>
-  <p:timing>
-    <p:tnLst>
-      <p:par>
-        <p:cTn id="1" dur="indefinite" restart="never" nodeType="tmRoot"/>
-      </p:par>
-    </p:tnLst>
-  </p:timing>
 </p:sldLayout>
 </file>
 
@@ -354,10 +345,9 @@
           <a:lstStyle/>
           <a:p>
             <a:r>
-              <a:rPr lang="en-US" smtClean="0"/>
+              <a:rPr lang="en-US"/>
               <a:t>Click to edit Master title style</a:t>
             </a:r>
-            <a:endParaRPr lang="en-US"/>
           </a:p>
         </p:txBody>
       </p:sp>
@@ -378,38 +368,37 @@
           <a:p>
             <a:pPr lvl="0"/>
             <a:r>
-              <a:rPr lang="en-US" smtClean="0"/>
+              <a:rPr lang="en-US"/>
               <a:t>Edit Master text styles</a:t>
             </a:r>
           </a:p>
           <a:p>
             <a:pPr lvl="1"/>
             <a:r>
-              <a:rPr lang="en-US" smtClean="0"/>
+              <a:rPr lang="en-US"/>
               <a:t>Second level</a:t>
             </a:r>
           </a:p>
           <a:p>
             <a:pPr lvl="2"/>
             <a:r>
-              <a:rPr lang="en-US" smtClean="0"/>
+              <a:rPr lang="en-US"/>
               <a:t>Third level</a:t>
             </a:r>
           </a:p>
           <a:p>
             <a:pPr lvl="3"/>
             <a:r>
-              <a:rPr lang="en-US" smtClean="0"/>
+              <a:rPr lang="en-US"/>
               <a:t>Fourth level</a:t>
             </a:r>
           </a:p>
           <a:p>
             <a:pPr lvl="4"/>
             <a:r>
-              <a:rPr lang="en-US" smtClean="0"/>
+              <a:rPr lang="en-US"/>
               <a:t>Fifth level</a:t>
             </a:r>
-            <a:endParaRPr lang="en-US"/>
           </a:p>
         </p:txBody>
       </p:sp>
@@ -430,7 +419,7 @@
           <a:p>
             <a:fld id="{8D1E8DE6-3E2F-4801-92CD-87E53721B098}" type="datetimeFigureOut">
               <a:rPr lang="en-US" smtClean="0"/>
-              <a:t>10-Oct-18</a:t>
+              <a:t>10/10/2018</a:t>
             </a:fld>
             <a:endParaRPr lang="en-US"/>
           </a:p>
@@ -529,10 +518,9 @@
           <a:lstStyle/>
           <a:p>
             <a:r>
-              <a:rPr lang="en-US" smtClean="0"/>
+              <a:rPr lang="en-US"/>
               <a:t>Click to edit Master title style</a:t>
             </a:r>
-            <a:endParaRPr lang="en-US"/>
           </a:p>
         </p:txBody>
       </p:sp>
@@ -558,38 +546,37 @@
           <a:p>
             <a:pPr lvl="0"/>
             <a:r>
-              <a:rPr lang="en-US" smtClean="0"/>
+              <a:rPr lang="en-US"/>
               <a:t>Edit Master text styles</a:t>
             </a:r>
           </a:p>
           <a:p>
             <a:pPr lvl="1"/>
             <a:r>
-              <a:rPr lang="en-US" smtClean="0"/>
+              <a:rPr lang="en-US"/>
               <a:t>Second level</a:t>
             </a:r>
           </a:p>
           <a:p>
             <a:pPr lvl="2"/>
             <a:r>
-              <a:rPr lang="en-US" smtClean="0"/>
+              <a:rPr lang="en-US"/>
               <a:t>Third level</a:t>
             </a:r>
           </a:p>
           <a:p>
             <a:pPr lvl="3"/>
             <a:r>
-              <a:rPr lang="en-US" smtClean="0"/>
+              <a:rPr lang="en-US"/>
               <a:t>Fourth level</a:t>
             </a:r>
           </a:p>
           <a:p>
             <a:pPr lvl="4"/>
             <a:r>
-              <a:rPr lang="en-US" smtClean="0"/>
+              <a:rPr lang="en-US"/>
               <a:t>Fifth level</a:t>
             </a:r>
-            <a:endParaRPr lang="en-US"/>
           </a:p>
         </p:txBody>
       </p:sp>
@@ -610,7 +597,7 @@
           <a:p>
             <a:fld id="{8D1E8DE6-3E2F-4801-92CD-87E53721B098}" type="datetimeFigureOut">
               <a:rPr lang="en-US" smtClean="0"/>
-              <a:t>10-Oct-18</a:t>
+              <a:t>10/10/2018</a:t>
             </a:fld>
             <a:endParaRPr lang="en-US"/>
           </a:p>
@@ -704,10 +691,9 @@
           <a:lstStyle/>
           <a:p>
             <a:r>
-              <a:rPr lang="en-US" smtClean="0"/>
+              <a:rPr lang="en-US"/>
               <a:t>Click to edit Master title style</a:t>
             </a:r>
-            <a:endParaRPr lang="en-US"/>
           </a:p>
         </p:txBody>
       </p:sp>
@@ -728,38 +714,37 @@
           <a:p>
             <a:pPr lvl="0"/>
             <a:r>
-              <a:rPr lang="en-US" smtClean="0"/>
+              <a:rPr lang="en-US"/>
               <a:t>Edit Master text styles</a:t>
             </a:r>
           </a:p>
           <a:p>
             <a:pPr lvl="1"/>
             <a:r>
-              <a:rPr lang="en-US" smtClean="0"/>
+              <a:rPr lang="en-US"/>
               <a:t>Second level</a:t>
             </a:r>
           </a:p>
           <a:p>
             <a:pPr lvl="2"/>
             <a:r>
-              <a:rPr lang="en-US" smtClean="0"/>
+              <a:rPr lang="en-US"/>
               <a:t>Third level</a:t>
             </a:r>
           </a:p>
           <a:p>
             <a:pPr lvl="3"/>
             <a:r>
-              <a:rPr lang="en-US" smtClean="0"/>
+              <a:rPr lang="en-US"/>
               <a:t>Fourth level</a:t>
             </a:r>
           </a:p>
           <a:p>
             <a:pPr lvl="4"/>
             <a:r>
-              <a:rPr lang="en-US" smtClean="0"/>
+              <a:rPr lang="en-US"/>
               <a:t>Fifth level</a:t>
             </a:r>
-            <a:endParaRPr lang="en-US"/>
           </a:p>
         </p:txBody>
       </p:sp>
@@ -780,7 +765,7 @@
           <a:p>
             <a:fld id="{8D1E8DE6-3E2F-4801-92CD-87E53721B098}" type="datetimeFigureOut">
               <a:rPr lang="en-US" smtClean="0"/>
-              <a:t>10-Oct-18</a:t>
+              <a:t>10/10/2018</a:t>
             </a:fld>
             <a:endParaRPr lang="en-US"/>
           </a:p>
@@ -883,10 +868,9 @@
           </a:lstStyle>
           <a:p>
             <a:r>
-              <a:rPr lang="en-US" smtClean="0"/>
+              <a:rPr lang="en-US"/>
               <a:t>Click to edit Master title style</a:t>
             </a:r>
-            <a:endParaRPr lang="en-US"/>
           </a:p>
         </p:txBody>
       </p:sp>
@@ -1003,7 +987,7 @@
           <a:p>
             <a:pPr lvl="0"/>
             <a:r>
-              <a:rPr lang="en-US" smtClean="0"/>
+              <a:rPr lang="en-US"/>
               <a:t>Edit Master text styles</a:t>
             </a:r>
           </a:p>
@@ -1026,7 +1010,7 @@
           <a:p>
             <a:fld id="{8D1E8DE6-3E2F-4801-92CD-87E53721B098}" type="datetimeFigureOut">
               <a:rPr lang="en-US" smtClean="0"/>
-              <a:t>10-Oct-18</a:t>
+              <a:t>10/10/2018</a:t>
             </a:fld>
             <a:endParaRPr lang="en-US"/>
           </a:p>
@@ -1120,10 +1104,9 @@
           <a:lstStyle/>
           <a:p>
             <a:r>
-              <a:rPr lang="en-US" smtClean="0"/>
+              <a:rPr lang="en-US"/>
               <a:t>Click to edit Master title style</a:t>
             </a:r>
-            <a:endParaRPr lang="en-US"/>
           </a:p>
         </p:txBody>
       </p:sp>
@@ -1149,38 +1132,37 @@
           <a:p>
             <a:pPr lvl="0"/>
             <a:r>
-              <a:rPr lang="en-US" smtClean="0"/>
+              <a:rPr lang="en-US"/>
               <a:t>Edit Master text styles</a:t>
             </a:r>
           </a:p>
           <a:p>
             <a:pPr lvl="1"/>
             <a:r>
-              <a:rPr lang="en-US" smtClean="0"/>
+              <a:rPr lang="en-US"/>
               <a:t>Second level</a:t>
             </a:r>
           </a:p>
           <a:p>
             <a:pPr lvl="2"/>
             <a:r>
-              <a:rPr lang="en-US" smtClean="0"/>
+              <a:rPr lang="en-US"/>
               <a:t>Third level</a:t>
             </a:r>
           </a:p>
           <a:p>
             <a:pPr lvl="3"/>
             <a:r>
-              <a:rPr lang="en-US" smtClean="0"/>
+              <a:rPr lang="en-US"/>
               <a:t>Fourth level</a:t>
             </a:r>
           </a:p>
           <a:p>
             <a:pPr lvl="4"/>
             <a:r>
-              <a:rPr lang="en-US" smtClean="0"/>
+              <a:rPr lang="en-US"/>
               <a:t>Fifth level</a:t>
             </a:r>
-            <a:endParaRPr lang="en-US"/>
           </a:p>
         </p:txBody>
       </p:sp>
@@ -1206,38 +1188,37 @@
           <a:p>
             <a:pPr lvl="0"/>
             <a:r>
-              <a:rPr lang="en-US" smtClean="0"/>
+              <a:rPr lang="en-US"/>
               <a:t>Edit Master text styles</a:t>
             </a:r>
           </a:p>
           <a:p>
             <a:pPr lvl="1"/>
             <a:r>
-              <a:rPr lang="en-US" smtClean="0"/>
+              <a:rPr lang="en-US"/>
               <a:t>Second level</a:t>
             </a:r>
           </a:p>
           <a:p>
             <a:pPr lvl="2"/>
             <a:r>
-              <a:rPr lang="en-US" smtClean="0"/>
+              <a:rPr lang="en-US"/>
               <a:t>Third level</a:t>
             </a:r>
           </a:p>
           <a:p>
             <a:pPr lvl="3"/>
             <a:r>
-              <a:rPr lang="en-US" smtClean="0"/>
+              <a:rPr lang="en-US"/>
               <a:t>Fourth level</a:t>
             </a:r>
           </a:p>
           <a:p>
             <a:pPr lvl="4"/>
             <a:r>
-              <a:rPr lang="en-US" smtClean="0"/>
+              <a:rPr lang="en-US"/>
               <a:t>Fifth level</a:t>
             </a:r>
-            <a:endParaRPr lang="en-US"/>
           </a:p>
         </p:txBody>
       </p:sp>
@@ -1258,7 +1239,7 @@
           <a:p>
             <a:fld id="{8D1E8DE6-3E2F-4801-92CD-87E53721B098}" type="datetimeFigureOut">
               <a:rPr lang="en-US" smtClean="0"/>
-              <a:t>10-Oct-18</a:t>
+              <a:t>10/10/2018</a:t>
             </a:fld>
             <a:endParaRPr lang="en-US"/>
           </a:p>
@@ -1357,10 +1338,9 @@
           <a:lstStyle/>
           <a:p>
             <a:r>
-              <a:rPr lang="en-US" smtClean="0"/>
+              <a:rPr lang="en-US"/>
               <a:t>Click to edit Master title style</a:t>
             </a:r>
-            <a:endParaRPr lang="en-US"/>
           </a:p>
         </p:txBody>
       </p:sp>
@@ -1423,7 +1403,7 @@
           <a:p>
             <a:pPr lvl="0"/>
             <a:r>
-              <a:rPr lang="en-US" smtClean="0"/>
+              <a:rPr lang="en-US"/>
               <a:t>Edit Master text styles</a:t>
             </a:r>
           </a:p>
@@ -1451,38 +1431,37 @@
           <a:p>
             <a:pPr lvl="0"/>
             <a:r>
-              <a:rPr lang="en-US" smtClean="0"/>
+              <a:rPr lang="en-US"/>
               <a:t>Edit Master text styles</a:t>
             </a:r>
           </a:p>
           <a:p>
             <a:pPr lvl="1"/>
             <a:r>
-              <a:rPr lang="en-US" smtClean="0"/>
+              <a:rPr lang="en-US"/>
               <a:t>Second level</a:t>
             </a:r>
           </a:p>
           <a:p>
             <a:pPr lvl="2"/>
             <a:r>
-              <a:rPr lang="en-US" smtClean="0"/>
+              <a:rPr lang="en-US"/>
               <a:t>Third level</a:t>
             </a:r>
           </a:p>
           <a:p>
             <a:pPr lvl="3"/>
             <a:r>
-              <a:rPr lang="en-US" smtClean="0"/>
+              <a:rPr lang="en-US"/>
               <a:t>Fourth level</a:t>
             </a:r>
           </a:p>
           <a:p>
             <a:pPr lvl="4"/>
             <a:r>
-              <a:rPr lang="en-US" smtClean="0"/>
+              <a:rPr lang="en-US"/>
               <a:t>Fifth level</a:t>
             </a:r>
-            <a:endParaRPr lang="en-US"/>
           </a:p>
         </p:txBody>
       </p:sp>
@@ -1545,7 +1524,7 @@
           <a:p>
             <a:pPr lvl="0"/>
             <a:r>
-              <a:rPr lang="en-US" smtClean="0"/>
+              <a:rPr lang="en-US"/>
               <a:t>Edit Master text styles</a:t>
             </a:r>
           </a:p>
@@ -1573,38 +1552,37 @@
           <a:p>
             <a:pPr lvl="0"/>
             <a:r>
-              <a:rPr lang="en-US" smtClean="0"/>
+              <a:rPr lang="en-US"/>
               <a:t>Edit Master text styles</a:t>
             </a:r>
           </a:p>
           <a:p>
             <a:pPr lvl="1"/>
             <a:r>
-              <a:rPr lang="en-US" smtClean="0"/>
+              <a:rPr lang="en-US"/>
               <a:t>Second level</a:t>
             </a:r>
           </a:p>
           <a:p>
             <a:pPr lvl="2"/>
             <a:r>
-              <a:rPr lang="en-US" smtClean="0"/>
+              <a:rPr lang="en-US"/>
               <a:t>Third level</a:t>
             </a:r>
           </a:p>
           <a:p>
             <a:pPr lvl="3"/>
             <a:r>
-              <a:rPr lang="en-US" smtClean="0"/>
+              <a:rPr lang="en-US"/>
               <a:t>Fourth level</a:t>
             </a:r>
           </a:p>
           <a:p>
             <a:pPr lvl="4"/>
             <a:r>
-              <a:rPr lang="en-US" smtClean="0"/>
+              <a:rPr lang="en-US"/>
               <a:t>Fifth level</a:t>
             </a:r>
-            <a:endParaRPr lang="en-US"/>
           </a:p>
         </p:txBody>
       </p:sp>
@@ -1625,7 +1603,7 @@
           <a:p>
             <a:fld id="{8D1E8DE6-3E2F-4801-92CD-87E53721B098}" type="datetimeFigureOut">
               <a:rPr lang="en-US" smtClean="0"/>
-              <a:t>10-Oct-18</a:t>
+              <a:t>10/10/2018</a:t>
             </a:fld>
             <a:endParaRPr lang="en-US"/>
           </a:p>
@@ -1719,10 +1697,9 @@
           <a:lstStyle/>
           <a:p>
             <a:r>
-              <a:rPr lang="en-US" smtClean="0"/>
+              <a:rPr lang="en-US"/>
               <a:t>Click to edit Master title style</a:t>
             </a:r>
-            <a:endParaRPr lang="en-US"/>
           </a:p>
         </p:txBody>
       </p:sp>
@@ -1743,7 +1720,7 @@
           <a:p>
             <a:fld id="{8D1E8DE6-3E2F-4801-92CD-87E53721B098}" type="datetimeFigureOut">
               <a:rPr lang="en-US" smtClean="0"/>
-              <a:t>10-Oct-18</a:t>
+              <a:t>10/10/2018</a:t>
             </a:fld>
             <a:endParaRPr lang="en-US"/>
           </a:p>
@@ -1838,7 +1815,7 @@
           <a:p>
             <a:fld id="{8D1E8DE6-3E2F-4801-92CD-87E53721B098}" type="datetimeFigureOut">
               <a:rPr lang="en-US" smtClean="0"/>
-              <a:t>10-Oct-18</a:t>
+              <a:t>10/10/2018</a:t>
             </a:fld>
             <a:endParaRPr lang="en-US"/>
           </a:p>
@@ -1941,10 +1918,9 @@
           </a:lstStyle>
           <a:p>
             <a:r>
-              <a:rPr lang="en-US" smtClean="0"/>
+              <a:rPr lang="en-US"/>
               <a:t>Click to edit Master title style</a:t>
             </a:r>
-            <a:endParaRPr lang="en-US"/>
           </a:p>
         </p:txBody>
       </p:sp>
@@ -1998,38 +1974,37 @@
           <a:p>
             <a:pPr lvl="0"/>
             <a:r>
-              <a:rPr lang="en-US" smtClean="0"/>
+              <a:rPr lang="en-US"/>
               <a:t>Edit Master text styles</a:t>
             </a:r>
           </a:p>
           <a:p>
             <a:pPr lvl="1"/>
             <a:r>
-              <a:rPr lang="en-US" smtClean="0"/>
+              <a:rPr lang="en-US"/>
               <a:t>Second level</a:t>
             </a:r>
           </a:p>
           <a:p>
             <a:pPr lvl="2"/>
             <a:r>
-              <a:rPr lang="en-US" smtClean="0"/>
+              <a:rPr lang="en-US"/>
               <a:t>Third level</a:t>
             </a:r>
           </a:p>
           <a:p>
             <a:pPr lvl="3"/>
             <a:r>
-              <a:rPr lang="en-US" smtClean="0"/>
+              <a:rPr lang="en-US"/>
               <a:t>Fourth level</a:t>
             </a:r>
           </a:p>
           <a:p>
             <a:pPr lvl="4"/>
             <a:r>
-              <a:rPr lang="en-US" smtClean="0"/>
+              <a:rPr lang="en-US"/>
               <a:t>Fifth level</a:t>
             </a:r>
-            <a:endParaRPr lang="en-US"/>
           </a:p>
         </p:txBody>
       </p:sp>
@@ -2092,7 +2067,7 @@
           <a:p>
             <a:pPr lvl="0"/>
             <a:r>
-              <a:rPr lang="en-US" smtClean="0"/>
+              <a:rPr lang="en-US"/>
               <a:t>Edit Master text styles</a:t>
             </a:r>
           </a:p>
@@ -2115,7 +2090,7 @@
           <a:p>
             <a:fld id="{8D1E8DE6-3E2F-4801-92CD-87E53721B098}" type="datetimeFigureOut">
               <a:rPr lang="en-US" smtClean="0"/>
-              <a:t>10-Oct-18</a:t>
+              <a:t>10/10/2018</a:t>
             </a:fld>
             <a:endParaRPr lang="en-US"/>
           </a:p>
@@ -2218,10 +2193,9 @@
           </a:lstStyle>
           <a:p>
             <a:r>
-              <a:rPr lang="en-US" smtClean="0"/>
+              <a:rPr lang="en-US"/>
               <a:t>Click to edit Master title style</a:t>
             </a:r>
-            <a:endParaRPr lang="en-US"/>
           </a:p>
         </p:txBody>
       </p:sp>
@@ -2345,7 +2319,7 @@
           <a:p>
             <a:pPr lvl="0"/>
             <a:r>
-              <a:rPr lang="en-US" smtClean="0"/>
+              <a:rPr lang="en-US"/>
               <a:t>Edit Master text styles</a:t>
             </a:r>
           </a:p>
@@ -2368,7 +2342,7 @@
           <a:p>
             <a:fld id="{8D1E8DE6-3E2F-4801-92CD-87E53721B098}" type="datetimeFigureOut">
               <a:rPr lang="en-US" smtClean="0"/>
-              <a:t>10-Oct-18</a:t>
+              <a:t>10/10/2018</a:t>
             </a:fld>
             <a:endParaRPr lang="en-US"/>
           </a:p>
@@ -2477,10 +2451,9 @@
           <a:lstStyle/>
           <a:p>
             <a:r>
-              <a:rPr lang="en-US" smtClean="0"/>
+              <a:rPr lang="en-US"/>
               <a:t>Click to edit Master title style</a:t>
             </a:r>
-            <a:endParaRPr lang="en-US"/>
           </a:p>
         </p:txBody>
       </p:sp>
@@ -2511,38 +2484,37 @@
           <a:p>
             <a:pPr lvl="0"/>
             <a:r>
-              <a:rPr lang="en-US" smtClean="0"/>
+              <a:rPr lang="en-US"/>
               <a:t>Edit Master text styles</a:t>
             </a:r>
           </a:p>
           <a:p>
             <a:pPr lvl="1"/>
             <a:r>
-              <a:rPr lang="en-US" smtClean="0"/>
+              <a:rPr lang="en-US"/>
               <a:t>Second level</a:t>
             </a:r>
           </a:p>
           <a:p>
             <a:pPr lvl="2"/>
             <a:r>
-              <a:rPr lang="en-US" smtClean="0"/>
+              <a:rPr lang="en-US"/>
               <a:t>Third level</a:t>
             </a:r>
           </a:p>
           <a:p>
             <a:pPr lvl="3"/>
             <a:r>
-              <a:rPr lang="en-US" smtClean="0"/>
+              <a:rPr lang="en-US"/>
               <a:t>Fourth level</a:t>
             </a:r>
           </a:p>
           <a:p>
             <a:pPr lvl="4"/>
             <a:r>
-              <a:rPr lang="en-US" smtClean="0"/>
+              <a:rPr lang="en-US"/>
               <a:t>Fifth level</a:t>
             </a:r>
-            <a:endParaRPr lang="en-US"/>
           </a:p>
         </p:txBody>
       </p:sp>
@@ -2581,7 +2553,7 @@
           <a:p>
             <a:fld id="{8D1E8DE6-3E2F-4801-92CD-87E53721B098}" type="datetimeFigureOut">
               <a:rPr lang="en-US" smtClean="0"/>
-              <a:t>10-Oct-18</a:t>
+              <a:t>10/10/2018</a:t>
             </a:fld>
             <a:endParaRPr lang="en-US"/>
           </a:p>
@@ -3004,7 +2976,7 @@
           <a:lstStyle/>
           <a:p>
             <a:r>
-              <a:rPr lang="en-GB" dirty="0" smtClean="0"/>
+              <a:rPr lang="en-GB" dirty="0"/>
               <a:t>Fluid breakthrough experiments</a:t>
             </a:r>
             <a:endParaRPr lang="en-US" dirty="0"/>
@@ -3027,27 +2999,23 @@
           <a:lstStyle/>
           <a:p>
             <a:r>
-              <a:rPr lang="en-GB" dirty="0" smtClean="0"/>
+              <a:rPr lang="en-GB" dirty="0"/>
               <a:t>Oliver Bond, Meredith Ellis, Nicolas </a:t>
             </a:r>
             <a:r>
-              <a:rPr lang="en-GB" dirty="0" err="1" smtClean="0"/>
+              <a:rPr lang="en-GB" dirty="0" err="1"/>
               <a:t>Boullé</a:t>
             </a:r>
             <a:r>
               <a:rPr lang="en-GB" dirty="0"/>
-              <a:t> </a:t>
-            </a:r>
-            <a:r>
-              <a:rPr lang="en-GB" dirty="0" smtClean="0"/>
-              <a:t>and </a:t>
-            </a:r>
-            <a:r>
-              <a:rPr lang="en-GB" dirty="0" err="1" smtClean="0"/>
+              <a:t> and </a:t>
+            </a:r>
+            <a:r>
+              <a:rPr lang="en-GB" dirty="0" err="1"/>
               <a:t>Huining</a:t>
             </a:r>
             <a:r>
-              <a:rPr lang="en-GB" dirty="0" smtClean="0"/>
+              <a:rPr lang="en-GB" dirty="0"/>
               <a:t> Yang</a:t>
             </a:r>
             <a:endParaRPr lang="en-US" dirty="0"/>
@@ -3064,13 +3032,6 @@
   <p:clrMapOvr>
     <a:masterClrMapping/>
   </p:clrMapOvr>
-  <p:timing>
-    <p:tnLst>
-      <p:par>
-        <p:cTn id="1" dur="indefinite" restart="never" nodeType="tmRoot"/>
-      </p:par>
-    </p:tnLst>
-  </p:timing>
 </p:sld>
 </file>
 
@@ -3093,535 +3054,95 @@
       </p:grpSpPr>
       <p:sp>
         <p:nvSpPr>
-          <p:cNvPr id="5" name="Content Placeholder 4"/>
-          <p:cNvSpPr>
-            <a:spLocks noGrp="1"/>
-          </p:cNvSpPr>
-          <p:nvPr>
-            <p:ph idx="1"/>
-          </p:nvPr>
-        </p:nvSpPr>
-        <p:spPr/>
+          <p:cNvPr id="2" name="Title 1"/>
+          <p:cNvSpPr>
+            <a:spLocks noGrp="1"/>
+          </p:cNvSpPr>
+          <p:nvPr>
+            <p:ph type="title"/>
+          </p:nvPr>
+        </p:nvSpPr>
+        <p:spPr>
+          <a:xfrm>
+            <a:off x="302491" y="-189057"/>
+            <a:ext cx="10515600" cy="1325563"/>
+          </a:xfrm>
+        </p:spPr>
         <p:txBody>
           <a:bodyPr/>
           <a:lstStyle/>
           <a:p>
+            <a:r>
+              <a:rPr lang="en-GB" dirty="0"/>
+              <a:t>Further work </a:t>
+            </a:r>
+            <a:r>
+              <a:rPr lang="en-GB" sz="3200" dirty="0"/>
+              <a:t>– two circles of different radius?</a:t>
+            </a:r>
             <a:endParaRPr lang="en-US" dirty="0"/>
           </a:p>
         </p:txBody>
       </p:sp>
       <p:pic>
         <p:nvPicPr>
-          <p:cNvPr id="4" name="Picture 3"/>
+          <p:cNvPr id="7" name="Picture 2" descr="test.jpg">
+            <a:extLst>
+              <a:ext uri="{FF2B5EF4-FFF2-40B4-BE49-F238E27FC236}">
+                <a16:creationId xmlns:a16="http://schemas.microsoft.com/office/drawing/2014/main" id="{4DD249F5-D487-4408-A23C-A105BA089D74}"/>
+              </a:ext>
+            </a:extLst>
+          </p:cNvPr>
           <p:cNvPicPr>
-            <a:picLocks noChangeAspect="1"/>
+            <a:picLocks noGrp="1" noChangeAspect="1" noChangeArrowheads="1"/>
           </p:cNvPicPr>
-          <p:nvPr/>
+          <p:nvPr>
+            <p:ph idx="1"/>
+          </p:nvPr>
         </p:nvPicPr>
         <p:blipFill>
-          <a:blip r:embed="rId2"/>
+          <a:blip r:embed="rId2" cstate="print">
+            <a:extLst>
+              <a:ext uri="{28A0092B-C50C-407E-A947-70E740481C1C}">
+                <a14:useLocalDpi xmlns:a14="http://schemas.microsoft.com/office/drawing/2010/main" val="0"/>
+              </a:ext>
+            </a:extLst>
+          </a:blip>
+          <a:srcRect/>
           <a:stretch>
             <a:fillRect/>
           </a:stretch>
         </p:blipFill>
-        <p:spPr>
+        <p:spPr bwMode="auto">
           <a:xfrm>
-            <a:off x="663169" y="1413369"/>
-            <a:ext cx="6849773" cy="3403165"/>
+            <a:off x="1373909" y="1053266"/>
+            <a:ext cx="9638161" cy="5131197"/>
           </a:xfrm>
           <a:prstGeom prst="rect">
             <a:avLst/>
           </a:prstGeom>
+          <a:noFill/>
+          <a:extLst>
+            <a:ext uri="{909E8E84-426E-40DD-AFC4-6F175D3DCCD1}">
+              <a14:hiddenFill xmlns:a14="http://schemas.microsoft.com/office/drawing/2010/main">
+                <a:solidFill>
+                  <a:srgbClr val="FFFFFF"/>
+                </a:solidFill>
+              </a14:hiddenFill>
+            </a:ext>
+          </a:extLst>
         </p:spPr>
       </p:pic>
-      <mc:AlternateContent xmlns:mc="http://schemas.openxmlformats.org/markup-compatibility/2006">
-        <mc:Choice xmlns:a14="http://schemas.microsoft.com/office/drawing/2010/main" Requires="a14">
-          <p:sp>
-            <p:nvSpPr>
-              <p:cNvPr id="10" name="Title 1"/>
-              <p:cNvSpPr>
-                <a:spLocks noGrp="1"/>
-              </p:cNvSpPr>
-              <p:nvPr>
-                <p:ph type="title"/>
-              </p:nvPr>
-            </p:nvSpPr>
-            <p:spPr>
-              <a:xfrm>
-                <a:off x="838200" y="365125"/>
-                <a:ext cx="10515600" cy="1325563"/>
-              </a:xfrm>
-            </p:spPr>
-            <p:txBody>
-              <a:bodyPr/>
-              <a:lstStyle/>
-              <a:p>
-                <a:pPr/>
-                <a14:m>
-                  <m:oMathPara xmlns:m="http://schemas.openxmlformats.org/officeDocument/2006/math">
-                    <m:oMathParaPr>
-                      <m:jc m:val="left"/>
-                    </m:oMathParaPr>
-                    <m:oMath xmlns:m="http://schemas.openxmlformats.org/officeDocument/2006/math">
-                      <m:r>
-                        <a:rPr lang="en-GB" b="0" i="1" dirty="0" smtClean="0">
-                          <a:latin typeface="Cambria Math" panose="02040503050406030204" pitchFamily="18" charset="0"/>
-                        </a:rPr>
-                        <m:t>𝜃</m:t>
-                      </m:r>
-                      <m:r>
-                        <a:rPr lang="en-GB" b="0" i="1" dirty="0" smtClean="0">
-                          <a:latin typeface="Cambria Math" panose="02040503050406030204" pitchFamily="18" charset="0"/>
-                        </a:rPr>
-                        <m:t>=</m:t>
-                      </m:r>
-                      <m:f>
-                        <m:fPr>
-                          <m:ctrlPr>
-                            <a:rPr lang="en-GB" i="1" dirty="0" smtClean="0">
-                              <a:latin typeface="Cambria Math" panose="02040503050406030204" pitchFamily="18" charset="0"/>
-                            </a:rPr>
-                          </m:ctrlPr>
-                        </m:fPr>
-                        <m:num>
-                          <m:r>
-                            <a:rPr lang="en-GB" b="0" i="1" dirty="0" smtClean="0">
-                              <a:latin typeface="Cambria Math" panose="02040503050406030204" pitchFamily="18" charset="0"/>
-                            </a:rPr>
-                            <m:t>𝜋</m:t>
-                          </m:r>
-                        </m:num>
-                        <m:den>
-                          <m:r>
-                            <a:rPr lang="en-GB" b="0" i="1" dirty="0" smtClean="0">
-                              <a:latin typeface="Cambria Math" panose="02040503050406030204" pitchFamily="18" charset="0"/>
-                            </a:rPr>
-                            <m:t>3</m:t>
-                          </m:r>
-                        </m:den>
-                      </m:f>
-                    </m:oMath>
-                  </m:oMathPara>
-                </a14:m>
-                <a:endParaRPr lang="en-US" dirty="0"/>
-              </a:p>
-            </p:txBody>
-          </p:sp>
-        </mc:Choice>
-        <mc:Fallback>
-          <p:sp>
-            <p:nvSpPr>
-              <p:cNvPr id="10" name="Title 1"/>
-              <p:cNvSpPr>
-                <a:spLocks noGrp="1" noRot="1" noChangeAspect="1" noMove="1" noResize="1" noEditPoints="1" noAdjustHandles="1" noChangeArrowheads="1" noChangeShapeType="1" noTextEdit="1"/>
-              </p:cNvSpPr>
-              <p:nvPr>
-                <p:ph type="title"/>
-              </p:nvPr>
-            </p:nvSpPr>
-            <p:spPr>
-              <a:xfrm>
-                <a:off x="838200" y="365125"/>
-                <a:ext cx="10515600" cy="1325563"/>
-              </a:xfrm>
-              <a:blipFill>
-                <a:blip r:embed="rId3"/>
-                <a:stretch>
-                  <a:fillRect/>
-                </a:stretch>
-              </a:blipFill>
-            </p:spPr>
-            <p:txBody>
-              <a:bodyPr/>
-              <a:lstStyle/>
-              <a:p>
-                <a:r>
-                  <a:rPr lang="en-US">
-                    <a:noFill/>
-                  </a:rPr>
-                  <a:t> </a:t>
-                </a:r>
-              </a:p>
-            </p:txBody>
-          </p:sp>
-        </mc:Fallback>
-      </mc:AlternateContent>
-      <p:pic>
-        <p:nvPicPr>
-          <p:cNvPr id="12" name="Picture 11"/>
-          <p:cNvPicPr>
-            <a:picLocks noChangeAspect="1"/>
-          </p:cNvPicPr>
-          <p:nvPr/>
-        </p:nvPicPr>
-        <p:blipFill>
-          <a:blip r:embed="rId4"/>
-          <a:stretch>
-            <a:fillRect/>
-          </a:stretch>
-        </p:blipFill>
-        <p:spPr>
-          <a:xfrm>
-            <a:off x="7619170" y="0"/>
-            <a:ext cx="4572830" cy="3325039"/>
-          </a:xfrm>
-          <a:prstGeom prst="rect">
-            <a:avLst/>
-          </a:prstGeom>
-        </p:spPr>
-      </p:pic>
-      <p:pic>
-        <p:nvPicPr>
-          <p:cNvPr id="13" name="Picture 12"/>
-          <p:cNvPicPr>
-            <a:picLocks noChangeAspect="1"/>
-          </p:cNvPicPr>
-          <p:nvPr/>
-        </p:nvPicPr>
-        <p:blipFill>
-          <a:blip r:embed="rId5"/>
-          <a:stretch>
-            <a:fillRect/>
-          </a:stretch>
-        </p:blipFill>
-        <p:spPr>
-          <a:xfrm>
-            <a:off x="7619170" y="3325040"/>
-            <a:ext cx="4572830" cy="3534230"/>
-          </a:xfrm>
-          <a:prstGeom prst="rect">
-            <a:avLst/>
-          </a:prstGeom>
-        </p:spPr>
-      </p:pic>
-      <mc:AlternateContent xmlns:mc="http://schemas.openxmlformats.org/markup-compatibility/2006">
-        <mc:Choice xmlns:a14="http://schemas.microsoft.com/office/drawing/2010/main" Requires="a14">
-          <p:sp>
-            <p:nvSpPr>
-              <p:cNvPr id="14" name="Content Placeholder 4"/>
-              <p:cNvSpPr txBox="1">
-                <a:spLocks/>
-              </p:cNvSpPr>
-              <p:nvPr/>
-            </p:nvSpPr>
-            <p:spPr>
-              <a:xfrm>
-                <a:off x="838200" y="4678053"/>
-                <a:ext cx="6504709" cy="1498909"/>
-              </a:xfrm>
-              <a:prstGeom prst="rect">
-                <a:avLst/>
-              </a:prstGeom>
-            </p:spPr>
-            <p:txBody>
-              <a:bodyPr vert="horz" lIns="91440" tIns="45720" rIns="91440" bIns="45720" rtlCol="0">
-                <a:normAutofit/>
-              </a:bodyPr>
-              <a:lstStyle>
-                <a:lvl1pPr marL="228600" indent="-228600" algn="l" defTabSz="914400" rtl="0" eaLnBrk="1" latinLnBrk="0" hangingPunct="1">
-                  <a:lnSpc>
-                    <a:spcPct val="90000"/>
-                  </a:lnSpc>
-                  <a:spcBef>
-                    <a:spcPts val="1000"/>
-                  </a:spcBef>
-                  <a:buFont typeface="Arial" panose="020B0604020202020204" pitchFamily="34" charset="0"/>
-                  <a:buChar char="•"/>
-                  <a:defRPr sz="2800" kern="1200">
-                    <a:solidFill>
-                      <a:schemeClr val="tx1"/>
-                    </a:solidFill>
-                    <a:latin typeface="+mn-lt"/>
-                    <a:ea typeface="+mn-ea"/>
-                    <a:cs typeface="+mn-cs"/>
-                  </a:defRPr>
-                </a:lvl1pPr>
-                <a:lvl2pPr marL="685800" indent="-228600" algn="l" defTabSz="914400" rtl="0" eaLnBrk="1" latinLnBrk="0" hangingPunct="1">
-                  <a:lnSpc>
-                    <a:spcPct val="90000"/>
-                  </a:lnSpc>
-                  <a:spcBef>
-                    <a:spcPts val="500"/>
-                  </a:spcBef>
-                  <a:buFont typeface="Arial" panose="020B0604020202020204" pitchFamily="34" charset="0"/>
-                  <a:buChar char="•"/>
-                  <a:defRPr sz="2400" kern="1200">
-                    <a:solidFill>
-                      <a:schemeClr val="tx1"/>
-                    </a:solidFill>
-                    <a:latin typeface="+mn-lt"/>
-                    <a:ea typeface="+mn-ea"/>
-                    <a:cs typeface="+mn-cs"/>
-                  </a:defRPr>
-                </a:lvl2pPr>
-                <a:lvl3pPr marL="1143000" indent="-228600" algn="l" defTabSz="914400" rtl="0" eaLnBrk="1" latinLnBrk="0" hangingPunct="1">
-                  <a:lnSpc>
-                    <a:spcPct val="90000"/>
-                  </a:lnSpc>
-                  <a:spcBef>
-                    <a:spcPts val="500"/>
-                  </a:spcBef>
-                  <a:buFont typeface="Arial" panose="020B0604020202020204" pitchFamily="34" charset="0"/>
-                  <a:buChar char="•"/>
-                  <a:defRPr sz="2000" kern="1200">
-                    <a:solidFill>
-                      <a:schemeClr val="tx1"/>
-                    </a:solidFill>
-                    <a:latin typeface="+mn-lt"/>
-                    <a:ea typeface="+mn-ea"/>
-                    <a:cs typeface="+mn-cs"/>
-                  </a:defRPr>
-                </a:lvl3pPr>
-                <a:lvl4pPr marL="1600200" indent="-228600" algn="l" defTabSz="914400" rtl="0" eaLnBrk="1" latinLnBrk="0" hangingPunct="1">
-                  <a:lnSpc>
-                    <a:spcPct val="90000"/>
-                  </a:lnSpc>
-                  <a:spcBef>
-                    <a:spcPts val="500"/>
-                  </a:spcBef>
-                  <a:buFont typeface="Arial" panose="020B0604020202020204" pitchFamily="34" charset="0"/>
-                  <a:buChar char="•"/>
-                  <a:defRPr sz="1800" kern="1200">
-                    <a:solidFill>
-                      <a:schemeClr val="tx1"/>
-                    </a:solidFill>
-                    <a:latin typeface="+mn-lt"/>
-                    <a:ea typeface="+mn-ea"/>
-                    <a:cs typeface="+mn-cs"/>
-                  </a:defRPr>
-                </a:lvl4pPr>
-                <a:lvl5pPr marL="2057400" indent="-228600" algn="l" defTabSz="914400" rtl="0" eaLnBrk="1" latinLnBrk="0" hangingPunct="1">
-                  <a:lnSpc>
-                    <a:spcPct val="90000"/>
-                  </a:lnSpc>
-                  <a:spcBef>
-                    <a:spcPts val="500"/>
-                  </a:spcBef>
-                  <a:buFont typeface="Arial" panose="020B0604020202020204" pitchFamily="34" charset="0"/>
-                  <a:buChar char="•"/>
-                  <a:defRPr sz="1800" kern="1200">
-                    <a:solidFill>
-                      <a:schemeClr val="tx1"/>
-                    </a:solidFill>
-                    <a:latin typeface="+mn-lt"/>
-                    <a:ea typeface="+mn-ea"/>
-                    <a:cs typeface="+mn-cs"/>
-                  </a:defRPr>
-                </a:lvl5pPr>
-                <a:lvl6pPr marL="2514600" indent="-228600" algn="l" defTabSz="914400" rtl="0" eaLnBrk="1" latinLnBrk="0" hangingPunct="1">
-                  <a:lnSpc>
-                    <a:spcPct val="90000"/>
-                  </a:lnSpc>
-                  <a:spcBef>
-                    <a:spcPts val="500"/>
-                  </a:spcBef>
-                  <a:buFont typeface="Arial" panose="020B0604020202020204" pitchFamily="34" charset="0"/>
-                  <a:buChar char="•"/>
-                  <a:defRPr sz="1800" kern="1200">
-                    <a:solidFill>
-                      <a:schemeClr val="tx1"/>
-                    </a:solidFill>
-                    <a:latin typeface="+mn-lt"/>
-                    <a:ea typeface="+mn-ea"/>
-                    <a:cs typeface="+mn-cs"/>
-                  </a:defRPr>
-                </a:lvl6pPr>
-                <a:lvl7pPr marL="2971800" indent="-228600" algn="l" defTabSz="914400" rtl="0" eaLnBrk="1" latinLnBrk="0" hangingPunct="1">
-                  <a:lnSpc>
-                    <a:spcPct val="90000"/>
-                  </a:lnSpc>
-                  <a:spcBef>
-                    <a:spcPts val="500"/>
-                  </a:spcBef>
-                  <a:buFont typeface="Arial" panose="020B0604020202020204" pitchFamily="34" charset="0"/>
-                  <a:buChar char="•"/>
-                  <a:defRPr sz="1800" kern="1200">
-                    <a:solidFill>
-                      <a:schemeClr val="tx1"/>
-                    </a:solidFill>
-                    <a:latin typeface="+mn-lt"/>
-                    <a:ea typeface="+mn-ea"/>
-                    <a:cs typeface="+mn-cs"/>
-                  </a:defRPr>
-                </a:lvl7pPr>
-                <a:lvl8pPr marL="3429000" indent="-228600" algn="l" defTabSz="914400" rtl="0" eaLnBrk="1" latinLnBrk="0" hangingPunct="1">
-                  <a:lnSpc>
-                    <a:spcPct val="90000"/>
-                  </a:lnSpc>
-                  <a:spcBef>
-                    <a:spcPts val="500"/>
-                  </a:spcBef>
-                  <a:buFont typeface="Arial" panose="020B0604020202020204" pitchFamily="34" charset="0"/>
-                  <a:buChar char="•"/>
-                  <a:defRPr sz="1800" kern="1200">
-                    <a:solidFill>
-                      <a:schemeClr val="tx1"/>
-                    </a:solidFill>
-                    <a:latin typeface="+mn-lt"/>
-                    <a:ea typeface="+mn-ea"/>
-                    <a:cs typeface="+mn-cs"/>
-                  </a:defRPr>
-                </a:lvl8pPr>
-                <a:lvl9pPr marL="3886200" indent="-228600" algn="l" defTabSz="914400" rtl="0" eaLnBrk="1" latinLnBrk="0" hangingPunct="1">
-                  <a:lnSpc>
-                    <a:spcPct val="90000"/>
-                  </a:lnSpc>
-                  <a:spcBef>
-                    <a:spcPts val="500"/>
-                  </a:spcBef>
-                  <a:buFont typeface="Arial" panose="020B0604020202020204" pitchFamily="34" charset="0"/>
-                  <a:buChar char="•"/>
-                  <a:defRPr sz="1800" kern="1200">
-                    <a:solidFill>
-                      <a:schemeClr val="tx1"/>
-                    </a:solidFill>
-                    <a:latin typeface="+mn-lt"/>
-                    <a:ea typeface="+mn-ea"/>
-                    <a:cs typeface="+mn-cs"/>
-                  </a:defRPr>
-                </a:lvl9pPr>
-              </a:lstStyle>
-              <a:p>
-                <a:pPr marL="0" indent="0">
-                  <a:buNone/>
-                </a:pPr>
-                <a14:m>
-                  <m:oMathPara xmlns:m="http://schemas.openxmlformats.org/officeDocument/2006/math">
-                    <m:oMathParaPr>
-                      <m:jc m:val="centerGroup"/>
-                    </m:oMathParaPr>
-                    <m:oMath xmlns:m="http://schemas.openxmlformats.org/officeDocument/2006/math">
-                      <m:r>
-                        <a:rPr lang="en-GB" i="1" smtClean="0">
-                          <a:latin typeface="Cambria Math" panose="02040503050406030204" pitchFamily="18" charset="0"/>
-                        </a:rPr>
-                        <m:t>𝛾</m:t>
-                      </m:r>
-                      <m:r>
-                        <a:rPr lang="en-GB" i="1" smtClean="0">
-                          <a:latin typeface="Cambria Math" panose="02040503050406030204" pitchFamily="18" charset="0"/>
-                        </a:rPr>
-                        <m:t>=7×</m:t>
-                      </m:r>
-                      <m:sSup>
-                        <m:sSupPr>
-                          <m:ctrlPr>
-                            <a:rPr lang="en-GB" i="1" smtClean="0">
-                              <a:latin typeface="Cambria Math" panose="02040503050406030204" pitchFamily="18" charset="0"/>
-                            </a:rPr>
-                          </m:ctrlPr>
-                        </m:sSupPr>
-                        <m:e>
-                          <m:r>
-                            <a:rPr lang="en-GB" i="1" smtClean="0">
-                              <a:latin typeface="Cambria Math" panose="02040503050406030204" pitchFamily="18" charset="0"/>
-                            </a:rPr>
-                            <m:t>10</m:t>
-                          </m:r>
-                        </m:e>
-                        <m:sup>
-                          <m:r>
-                            <a:rPr lang="en-GB" i="1" smtClean="0">
-                              <a:latin typeface="Cambria Math" panose="02040503050406030204" pitchFamily="18" charset="0"/>
-                            </a:rPr>
-                            <m:t>−2</m:t>
-                          </m:r>
-                        </m:sup>
-                      </m:sSup>
-                      <m:r>
-                        <a:rPr lang="en-GB" b="0" i="0" smtClean="0">
-                          <a:latin typeface="Cambria Math" panose="02040503050406030204" pitchFamily="18" charset="0"/>
-                        </a:rPr>
-                        <m:t> </m:t>
-                      </m:r>
-                      <m:r>
-                        <m:rPr>
-                          <m:sty m:val="p"/>
-                        </m:rPr>
-                        <a:rPr lang="en-GB">
-                          <a:latin typeface="Cambria Math" panose="02040503050406030204" pitchFamily="18" charset="0"/>
-                        </a:rPr>
-                        <m:t>N</m:t>
-                      </m:r>
-                      <m:r>
-                        <a:rPr lang="en-GB">
-                          <a:latin typeface="Cambria Math" panose="02040503050406030204" pitchFamily="18" charset="0"/>
-                        </a:rPr>
-                        <m:t>/</m:t>
-                      </m:r>
-                      <m:r>
-                        <m:rPr>
-                          <m:sty m:val="p"/>
-                        </m:rPr>
-                        <a:rPr lang="en-GB">
-                          <a:latin typeface="Cambria Math" panose="02040503050406030204" pitchFamily="18" charset="0"/>
-                        </a:rPr>
-                        <m:t>m</m:t>
-                      </m:r>
-                    </m:oMath>
-                  </m:oMathPara>
-                </a14:m>
-                <a:endParaRPr lang="en-US" dirty="0" smtClean="0"/>
-              </a:p>
-            </p:txBody>
-          </p:sp>
-        </mc:Choice>
-        <mc:Fallback>
-          <p:sp>
-            <p:nvSpPr>
-              <p:cNvPr id="14" name="Content Placeholder 4"/>
-              <p:cNvSpPr txBox="1">
-                <a:spLocks noRot="1" noChangeAspect="1" noMove="1" noResize="1" noEditPoints="1" noAdjustHandles="1" noChangeArrowheads="1" noChangeShapeType="1" noTextEdit="1"/>
-              </p:cNvSpPr>
-              <p:nvPr/>
-            </p:nvSpPr>
-            <p:spPr>
-              <a:xfrm>
-                <a:off x="838200" y="4678053"/>
-                <a:ext cx="6504709" cy="1498909"/>
-              </a:xfrm>
-              <a:prstGeom prst="rect">
-                <a:avLst/>
-              </a:prstGeom>
-              <a:blipFill>
-                <a:blip r:embed="rId6"/>
-                <a:stretch>
-                  <a:fillRect/>
-                </a:stretch>
-              </a:blipFill>
-            </p:spPr>
-            <p:txBody>
-              <a:bodyPr/>
-              <a:lstStyle/>
-              <a:p>
-                <a:r>
-                  <a:rPr lang="en-US">
-                    <a:noFill/>
-                  </a:rPr>
-                  <a:t> </a:t>
-                </a:r>
-              </a:p>
-            </p:txBody>
-          </p:sp>
-        </mc:Fallback>
-      </mc:AlternateContent>
     </p:spTree>
     <p:extLst>
       <p:ext uri="{BB962C8B-B14F-4D97-AF65-F5344CB8AC3E}">
-        <p14:creationId xmlns:p14="http://schemas.microsoft.com/office/powerpoint/2010/main" val="2766400791"/>
+        <p14:creationId xmlns:p14="http://schemas.microsoft.com/office/powerpoint/2010/main" val="2854767637"/>
       </p:ext>
     </p:extLst>
   </p:cSld>
   <p:clrMapOvr>
     <a:masterClrMapping/>
   </p:clrMapOvr>
-  <p:timing>
-    <p:tnLst>
-      <p:par>
-        <p:cTn id="1" dur="indefinite" restart="never" nodeType="tmRoot"/>
-      </p:par>
-    </p:tnLst>
-  </p:timing>
 </p:sld>
 </file>
 
@@ -3663,7 +3184,7 @@
           <a:lstStyle/>
           <a:p>
             <a:r>
-              <a:rPr lang="en-GB" dirty="0" smtClean="0"/>
+              <a:rPr lang="en-GB" dirty="0"/>
               <a:t>Further work</a:t>
             </a:r>
             <a:endParaRPr lang="en-US" dirty="0"/>
@@ -3740,20 +3261,13 @@
     </p:spTree>
     <p:extLst>
       <p:ext uri="{BB962C8B-B14F-4D97-AF65-F5344CB8AC3E}">
-        <p14:creationId xmlns:p14="http://schemas.microsoft.com/office/powerpoint/2010/main" val="2854767637"/>
+        <p14:creationId xmlns:p14="http://schemas.microsoft.com/office/powerpoint/2010/main" val="1364915160"/>
       </p:ext>
     </p:extLst>
   </p:cSld>
   <p:clrMapOvr>
     <a:masterClrMapping/>
   </p:clrMapOvr>
-  <p:timing>
-    <p:tnLst>
-      <p:par>
-        <p:cTn id="1" dur="indefinite" restart="never" nodeType="tmRoot"/>
-      </p:par>
-    </p:tnLst>
-  </p:timing>
 </p:sld>
 </file>
 
@@ -3790,7 +3304,7 @@
           <a:lstStyle/>
           <a:p>
             <a:r>
-              <a:rPr lang="en-GB" b="1" dirty="0" smtClean="0"/>
+              <a:rPr lang="en-GB" b="1" dirty="0"/>
               <a:t>The problem</a:t>
             </a:r>
             <a:endParaRPr lang="en-US" b="1" dirty="0"/>
@@ -3816,7 +3330,7 @@
               <a:buNone/>
             </a:pPr>
             <a:r>
-              <a:rPr lang="en-GB" dirty="0" smtClean="0"/>
+              <a:rPr lang="en-GB" dirty="0"/>
               <a:t>Suppose we have a small membrane in a container, made of some fibres. Liquid is slowly introduced on top of it until the membrane breaks.</a:t>
             </a:r>
           </a:p>
@@ -4239,13 +3753,6 @@
   <p:clrMapOvr>
     <a:masterClrMapping/>
   </p:clrMapOvr>
-  <p:timing>
-    <p:tnLst>
-      <p:par>
-        <p:cTn id="1" dur="indefinite" restart="never" nodeType="tmRoot"/>
-      </p:par>
-    </p:tnLst>
-  </p:timing>
 </p:sld>
 </file>
 
@@ -4501,7 +4008,7 @@
           <a:lstStyle/>
           <a:p>
             <a:r>
-              <a:rPr lang="en-GB" b="1" dirty="0" smtClean="0"/>
+              <a:rPr lang="en-GB" b="1" dirty="0"/>
               <a:t>The problem</a:t>
             </a:r>
             <a:endParaRPr lang="en-US" b="1" dirty="0"/>
@@ -4527,7 +4034,7 @@
               <a:buNone/>
             </a:pPr>
             <a:r>
-              <a:rPr lang="en-GB" i="1" dirty="0" smtClean="0"/>
+              <a:rPr lang="en-GB" i="1" dirty="0"/>
               <a:t>What is the shape of the meniscus between two fibres?</a:t>
             </a:r>
           </a:p>
@@ -4536,7 +4043,7 @@
               <a:buNone/>
             </a:pPr>
             <a:r>
-              <a:rPr lang="en-GB" i="1" dirty="0" smtClean="0"/>
+              <a:rPr lang="en-GB" i="1" dirty="0"/>
               <a:t>How does this depend on the physical parameters?</a:t>
             </a:r>
             <a:endParaRPr lang="en-US" i="1" dirty="0"/>
@@ -4709,7 +4216,7 @@
           <a:p>
             <a:pPr algn="ctr"/>
             <a:r>
-              <a:rPr lang="en-US" sz="5400" b="1" cap="none" spc="0" dirty="0" smtClean="0">
+              <a:rPr lang="en-US" sz="5400" b="1" cap="none" spc="0" dirty="0">
                 <a:ln w="0"/>
                 <a:solidFill>
                   <a:schemeClr val="tx1"/>
@@ -4724,19 +4231,6 @@
               </a:rPr>
               <a:t>?</a:t>
             </a:r>
-            <a:endParaRPr lang="en-US" sz="5400" b="1" cap="none" spc="0" dirty="0">
-              <a:ln w="0"/>
-              <a:solidFill>
-                <a:schemeClr val="tx1"/>
-              </a:solidFill>
-              <a:effectLst>
-                <a:outerShdw blurRad="38100" dist="19050" dir="2700000" algn="tl" rotWithShape="0">
-                  <a:schemeClr val="dk1">
-                    <a:alpha val="40000"/>
-                  </a:schemeClr>
-                </a:outerShdw>
-              </a:effectLst>
-            </a:endParaRPr>
           </a:p>
         </p:txBody>
       </p:sp>
@@ -4750,13 +4244,6 @@
   <p:clrMapOvr>
     <a:masterClrMapping/>
   </p:clrMapOvr>
-  <p:timing>
-    <p:tnLst>
-      <p:par>
-        <p:cTn id="1" dur="indefinite" restart="never" nodeType="tmRoot"/>
-      </p:par>
-    </p:tnLst>
-  </p:timing>
 </p:sld>
 </file>
 
@@ -4793,7 +4280,7 @@
           <a:lstStyle/>
           <a:p>
             <a:r>
-              <a:rPr lang="en-GB" b="1" dirty="0" smtClean="0"/>
+              <a:rPr lang="en-GB" b="1" dirty="0"/>
               <a:t>Assumptions</a:t>
             </a:r>
             <a:endParaRPr lang="en-US" b="1" dirty="0"/>
@@ -4818,82 +4305,82 @@
           <a:lstStyle/>
           <a:p>
             <a:r>
-              <a:rPr lang="en-GB" sz="3200" dirty="0" smtClean="0"/>
+              <a:rPr lang="en-GB" sz="3200" dirty="0"/>
               <a:t>Fluid is </a:t>
             </a:r>
             <a:r>
-              <a:rPr lang="en-GB" sz="3200" b="1" dirty="0" smtClean="0"/>
+              <a:rPr lang="en-GB" sz="3200" b="1" dirty="0"/>
               <a:t>static </a:t>
             </a:r>
             <a:r>
-              <a:rPr lang="en-GB" sz="3200" dirty="0" smtClean="0"/>
+              <a:rPr lang="en-GB" sz="3200" dirty="0"/>
               <a:t>and </a:t>
             </a:r>
             <a:r>
-              <a:rPr lang="en-GB" sz="3200" b="1" dirty="0" smtClean="0"/>
+              <a:rPr lang="en-GB" sz="3200" b="1" dirty="0"/>
               <a:t>incompressible</a:t>
             </a:r>
             <a:r>
-              <a:rPr lang="en-GB" sz="3200" dirty="0" smtClean="0"/>
+              <a:rPr lang="en-GB" sz="3200" dirty="0"/>
               <a:t>.</a:t>
             </a:r>
           </a:p>
           <a:p>
             <a:r>
-              <a:rPr lang="en-GB" sz="3200" dirty="0" smtClean="0"/>
+              <a:rPr lang="en-GB" sz="3200" dirty="0"/>
               <a:t>The pressure due to the fluid is </a:t>
             </a:r>
             <a:r>
-              <a:rPr lang="en-GB" sz="3200" b="1" dirty="0" smtClean="0"/>
+              <a:rPr lang="en-GB" sz="3200" b="1" dirty="0"/>
               <a:t>hydrostatic</a:t>
             </a:r>
             <a:r>
-              <a:rPr lang="en-GB" sz="3200" dirty="0" smtClean="0"/>
+              <a:rPr lang="en-GB" sz="3200" dirty="0"/>
               <a:t>.</a:t>
             </a:r>
           </a:p>
           <a:p>
             <a:r>
-              <a:rPr lang="en-GB" sz="3200" dirty="0" smtClean="0"/>
+              <a:rPr lang="en-GB" sz="3200" dirty="0"/>
               <a:t>The upward force is due to the </a:t>
             </a:r>
             <a:r>
-              <a:rPr lang="en-GB" sz="3200" b="1" dirty="0" smtClean="0"/>
+              <a:rPr lang="en-GB" sz="3200" b="1" dirty="0"/>
               <a:t>surface tension </a:t>
             </a:r>
             <a:r>
-              <a:rPr lang="en-GB" sz="3200" dirty="0" smtClean="0"/>
+              <a:rPr lang="en-GB" sz="3200" dirty="0"/>
               <a:t>of the fluid.</a:t>
             </a:r>
           </a:p>
           <a:p>
             <a:r>
-              <a:rPr lang="en-GB" sz="3200" dirty="0" smtClean="0"/>
+              <a:rPr lang="en-GB" sz="3200" dirty="0"/>
               <a:t>The membrane does </a:t>
             </a:r>
             <a:r>
-              <a:rPr lang="en-GB" sz="3200" b="1" dirty="0" smtClean="0"/>
+              <a:rPr lang="en-GB" sz="3200" b="1" dirty="0"/>
               <a:t>not bend</a:t>
             </a:r>
             <a:r>
-              <a:rPr lang="en-GB" sz="3200" dirty="0" smtClean="0"/>
+              <a:rPr lang="en-GB" sz="3200" dirty="0"/>
               <a:t>.</a:t>
             </a:r>
           </a:p>
           <a:p>
             <a:r>
-              <a:rPr lang="en-GB" sz="3200" dirty="0" smtClean="0"/>
+              <a:rPr lang="en-GB" sz="3200" dirty="0"/>
               <a:t>The system is in its </a:t>
             </a:r>
             <a:r>
-              <a:rPr lang="en-GB" sz="3200" b="1" dirty="0" smtClean="0"/>
+              <a:rPr lang="en-GB" sz="3200" b="1" dirty="0"/>
               <a:t>steady state</a:t>
             </a:r>
             <a:r>
-              <a:rPr lang="en-GB" sz="3200" dirty="0" smtClean="0"/>
+              <a:rPr lang="en-GB" sz="3200" dirty="0"/>
               <a:t>. </a:t>
             </a:r>
-            <a:endParaRPr lang="en-US" sz="3200" dirty="0" smtClean="0"/>
+            <a:endParaRPr lang="en-US" sz="3200" dirty="0"/>
           </a:p>
           <a:p>
             <a:endParaRPr lang="en-US" sz="3200" dirty="0"/>
@@ -4910,13 +4397,6 @@
   <p:clrMapOvr>
     <a:masterClrMapping/>
   </p:clrMapOvr>
-  <p:timing>
-    <p:tnLst>
-      <p:par>
-        <p:cTn id="1" dur="indefinite" restart="never" nodeType="tmRoot"/>
-      </p:par>
-    </p:tnLst>
-  </p:timing>
 </p:sld>
 </file>
 
@@ -4947,13 +4427,18 @@
             <p:ph type="title"/>
           </p:nvPr>
         </p:nvSpPr>
-        <p:spPr/>
+        <p:spPr>
+          <a:xfrm>
+            <a:off x="136864" y="-247434"/>
+            <a:ext cx="10515600" cy="1325563"/>
+          </a:xfrm>
+        </p:spPr>
         <p:txBody>
           <a:bodyPr/>
           <a:lstStyle/>
           <a:p>
             <a:r>
-              <a:rPr lang="en-GB" b="1" dirty="0" smtClean="0"/>
+              <a:rPr lang="en-GB" b="1" dirty="0"/>
               <a:t>Physical principles</a:t>
             </a:r>
             <a:endParaRPr lang="en-US" b="1" dirty="0"/>
@@ -4972,236 +4457,69 @@
                 <p:ph idx="1"/>
               </p:nvPr>
             </p:nvSpPr>
-            <p:spPr/>
+            <p:spPr>
+              <a:xfrm>
+                <a:off x="136864" y="751427"/>
+                <a:ext cx="5518212" cy="4351338"/>
+              </a:xfrm>
+            </p:spPr>
             <p:txBody>
               <a:bodyPr>
-                <a:normAutofit fontScale="85000" lnSpcReduction="20000"/>
+                <a:normAutofit/>
               </a:bodyPr>
               <a:lstStyle/>
-              <a:p>
-                <a:r>
-                  <a:rPr lang="en-GB" sz="3200" b="1" dirty="0" smtClean="0"/>
-                  <a:t>Newton’s second law</a:t>
-                </a:r>
-                <a:r>
-                  <a:rPr lang="en-GB" sz="3200" dirty="0" smtClean="0"/>
-                  <a:t> tells us that forces (and so pressures) are balanced.</a:t>
-                </a:r>
-              </a:p>
               <a:p>
                 <a:pPr marL="0" indent="0">
                   <a:buNone/>
                 </a:pPr>
                 <a:r>
-                  <a:rPr lang="en-GB" sz="3200" dirty="0" smtClean="0"/>
-                  <a:t> </a:t>
+                  <a:rPr lang="en-GB" sz="2000" b="1" dirty="0"/>
+                  <a:t>Newton’s second law</a:t>
                 </a:r>
-              </a:p>
-              <a:p>
-                <a:pPr marL="0" indent="0">
-                  <a:buNone/>
-                </a:pPr>
-                <a14:m>
-                  <m:oMathPara xmlns:m="http://schemas.openxmlformats.org/officeDocument/2006/math">
-                    <m:oMathParaPr>
-                      <m:jc m:val="centerGroup"/>
-                    </m:oMathParaPr>
-                    <m:oMath xmlns:m="http://schemas.openxmlformats.org/officeDocument/2006/math">
-                      <m:r>
-                        <a:rPr lang="en-US" sz="3200" i="1">
-                          <a:latin typeface="Cambria Math" panose="02040503050406030204" pitchFamily="18" charset="0"/>
-                          <a:ea typeface="Cambria Math" panose="02040503050406030204" pitchFamily="18" charset="0"/>
-                        </a:rPr>
-                        <m:t>𝜌</m:t>
-                      </m:r>
-                      <m:r>
-                        <a:rPr lang="en-GB" sz="3200" i="1">
-                          <a:latin typeface="Cambria Math" panose="02040503050406030204" pitchFamily="18" charset="0"/>
-                          <a:ea typeface="Cambria Math" panose="02040503050406030204" pitchFamily="18" charset="0"/>
-                        </a:rPr>
-                        <m:t>𝑔𝐻</m:t>
-                      </m:r>
-                      <m:r>
-                        <a:rPr lang="en-GB" sz="3200" i="1">
-                          <a:latin typeface="Cambria Math" panose="02040503050406030204" pitchFamily="18" charset="0"/>
-                          <a:ea typeface="Cambria Math" panose="02040503050406030204" pitchFamily="18" charset="0"/>
-                        </a:rPr>
-                        <m:t>=+ </m:t>
-                      </m:r>
-                      <m:r>
-                        <a:rPr lang="en-GB" sz="3200" i="1">
-                          <a:latin typeface="Cambria Math" panose="02040503050406030204" pitchFamily="18" charset="0"/>
-                          <a:ea typeface="Cambria Math" panose="02040503050406030204" pitchFamily="18" charset="0"/>
-                        </a:rPr>
-                        <m:t>𝜅𝛾</m:t>
-                      </m:r>
-                    </m:oMath>
-                  </m:oMathPara>
-                </a14:m>
-                <a:endParaRPr lang="en-US" sz="3200" dirty="0"/>
-              </a:p>
-              <a:p>
                 <a:r>
-                  <a:rPr lang="en-GB" sz="3200" b="1" dirty="0" smtClean="0"/>
-                  <a:t>Curvature</a:t>
+                  <a:rPr lang="en-GB" sz="2000" dirty="0"/>
+                  <a:t> tells us that forces </a:t>
                 </a:r>
-                <a:endParaRPr lang="en-US" sz="3200" b="1" dirty="0" smtClean="0"/>
-              </a:p>
-              <a:p>
-                <a:pPr marL="0" indent="0">
-                  <a:buNone/>
-                </a:pPr>
-                <a14:m>
-                  <m:oMathPara xmlns:m="http://schemas.openxmlformats.org/officeDocument/2006/math">
-                    <m:oMathParaPr>
-                      <m:jc m:val="centerGroup"/>
-                    </m:oMathParaPr>
-                    <m:oMath xmlns:m="http://schemas.openxmlformats.org/officeDocument/2006/math">
-                      <m:r>
-                        <a:rPr lang="en-GB" sz="3200" i="1">
-                          <a:latin typeface="Cambria Math" panose="02040503050406030204" pitchFamily="18" charset="0"/>
-                          <a:ea typeface="Cambria Math" panose="02040503050406030204" pitchFamily="18" charset="0"/>
-                        </a:rPr>
-                        <m:t>𝜅</m:t>
-                      </m:r>
-                      <m:r>
-                        <a:rPr lang="en-GB" sz="3200" b="0" i="1" smtClean="0">
-                          <a:latin typeface="Cambria Math" panose="02040503050406030204" pitchFamily="18" charset="0"/>
-                          <a:ea typeface="Cambria Math" panose="02040503050406030204" pitchFamily="18" charset="0"/>
-                        </a:rPr>
-                        <m:t>=</m:t>
-                      </m:r>
-                      <m:f>
-                        <m:fPr>
-                          <m:ctrlPr>
-                            <a:rPr lang="en-GB" sz="3200" b="0" i="1" smtClean="0">
-                              <a:latin typeface="Cambria Math" panose="02040503050406030204" pitchFamily="18" charset="0"/>
-                              <a:ea typeface="Cambria Math" panose="02040503050406030204" pitchFamily="18" charset="0"/>
-                            </a:rPr>
-                          </m:ctrlPr>
-                        </m:fPr>
-                        <m:num>
-                          <m:r>
-                            <a:rPr lang="en-GB" sz="3200" b="0" i="1" smtClean="0">
-                              <a:latin typeface="Cambria Math" panose="02040503050406030204" pitchFamily="18" charset="0"/>
-                              <a:ea typeface="Cambria Math" panose="02040503050406030204" pitchFamily="18" charset="0"/>
-                            </a:rPr>
-                            <m:t>1</m:t>
-                          </m:r>
-                        </m:num>
-                        <m:den>
-                          <m:sSub>
-                            <m:sSubPr>
-                              <m:ctrlPr>
-                                <a:rPr lang="en-GB" sz="3200" b="0" i="1" smtClean="0">
-                                  <a:latin typeface="Cambria Math" panose="02040503050406030204" pitchFamily="18" charset="0"/>
-                                  <a:ea typeface="Cambria Math" panose="02040503050406030204" pitchFamily="18" charset="0"/>
-                                </a:rPr>
-                              </m:ctrlPr>
-                            </m:sSubPr>
-                            <m:e>
-                              <m:r>
-                                <a:rPr lang="en-GB" sz="3200" b="0" i="1" smtClean="0">
-                                  <a:latin typeface="Cambria Math" panose="02040503050406030204" pitchFamily="18" charset="0"/>
-                                  <a:ea typeface="Cambria Math" panose="02040503050406030204" pitchFamily="18" charset="0"/>
-                                </a:rPr>
-                                <m:t>𝑅</m:t>
-                              </m:r>
-                            </m:e>
-                            <m:sub>
-                              <m:r>
-                                <a:rPr lang="en-GB" sz="3200" b="0" i="1" smtClean="0">
-                                  <a:latin typeface="Cambria Math" panose="02040503050406030204" pitchFamily="18" charset="0"/>
-                                  <a:ea typeface="Cambria Math" panose="02040503050406030204" pitchFamily="18" charset="0"/>
-                                </a:rPr>
-                                <m:t>𝑀</m:t>
-                              </m:r>
-                            </m:sub>
-                          </m:sSub>
-                        </m:den>
-                      </m:f>
-                    </m:oMath>
-                  </m:oMathPara>
-                </a14:m>
-                <a:endParaRPr lang="en-GB" sz="3200" dirty="0" smtClean="0"/>
-              </a:p>
-              <a:p>
-                <a:pPr marL="0" indent="0">
-                  <a:buNone/>
-                </a:pPr>
+                <a:br>
+                  <a:rPr lang="en-GB" sz="2000" dirty="0"/>
+                </a:br>
                 <a:r>
-                  <a:rPr lang="en-GB" sz="3200" b="1" dirty="0" smtClean="0"/>
-                  <a:t>Variables: </a:t>
+                  <a:rPr lang="en-GB" sz="2000" dirty="0"/>
+                  <a:t>(and so pressures) are balanced: </a:t>
                 </a:r>
-              </a:p>
-              <a:p>
-                <a:pPr marL="0" indent="0">
-                  <a:buNone/>
-                </a:pPr>
                 <a14:m>
                   <m:oMath xmlns:m="http://schemas.openxmlformats.org/officeDocument/2006/math">
                     <m:r>
-                      <a:rPr lang="en-GB" sz="3200" b="0" i="1" smtClean="0">
+                      <a:rPr lang="en-US" sz="2000" i="1">
                         <a:latin typeface="Cambria Math" panose="02040503050406030204" pitchFamily="18" charset="0"/>
+                        <a:ea typeface="Cambria Math" panose="02040503050406030204" pitchFamily="18" charset="0"/>
                       </a:rPr>
-                      <m:t>𝛼</m:t>
+                      <m:t>𝜌</m:t>
+                    </m:r>
+                    <m:r>
+                      <a:rPr lang="en-GB" sz="2000" i="1">
+                        <a:latin typeface="Cambria Math" panose="02040503050406030204" pitchFamily="18" charset="0"/>
+                        <a:ea typeface="Cambria Math" panose="02040503050406030204" pitchFamily="18" charset="0"/>
+                      </a:rPr>
+                      <m:t>𝑔𝐻</m:t>
+                    </m:r>
+                    <m:r>
+                      <a:rPr lang="en-GB" sz="2000" i="1">
+                        <a:latin typeface="Cambria Math" panose="02040503050406030204" pitchFamily="18" charset="0"/>
+                        <a:ea typeface="Cambria Math" panose="02040503050406030204" pitchFamily="18" charset="0"/>
+                      </a:rPr>
+                      <m:t>=+ </m:t>
+                    </m:r>
+                    <m:r>
+                      <a:rPr lang="en-GB" sz="2000" i="1">
+                        <a:latin typeface="Cambria Math" panose="02040503050406030204" pitchFamily="18" charset="0"/>
+                        <a:ea typeface="Cambria Math" panose="02040503050406030204" pitchFamily="18" charset="0"/>
+                      </a:rPr>
+                      <m:t>𝜅𝛾</m:t>
                     </m:r>
                   </m:oMath>
                 </a14:m>
-                <a:r>
-                  <a:rPr lang="en-GB" sz="3200" dirty="0" smtClean="0"/>
-                  <a:t> (the angle on contact compared to horizontal</a:t>
-                </a:r>
-                <a:r>
-                  <a:rPr lang="en-GB" sz="3200" dirty="0" smtClean="0"/>
-                  <a:t>)</a:t>
-                </a:r>
-                <a:br>
-                  <a:rPr lang="en-GB" sz="3200" dirty="0" smtClean="0"/>
-                </a:br>
-                <a:r>
-                  <a:rPr lang="en-GB" sz="3200" dirty="0" smtClean="0"/>
-                  <a:t/>
-                </a:r>
-                <a:br>
-                  <a:rPr lang="en-GB" sz="3200" dirty="0" smtClean="0"/>
-                </a:br>
-                <a14:m>
-                  <m:oMath xmlns:m="http://schemas.openxmlformats.org/officeDocument/2006/math">
-                    <m:sSub>
-                      <m:sSubPr>
-                        <m:ctrlPr>
-                          <a:rPr lang="en-GB" sz="3200" b="0" i="1" smtClean="0">
-                            <a:latin typeface="Cambria Math" panose="02040503050406030204" pitchFamily="18" charset="0"/>
-                            <a:ea typeface="Cambria Math" panose="02040503050406030204" pitchFamily="18" charset="0"/>
-                          </a:rPr>
-                        </m:ctrlPr>
-                      </m:sSubPr>
-                      <m:e>
-                        <m:r>
-                          <a:rPr lang="en-GB" sz="3200" b="0" i="1" smtClean="0">
-                            <a:latin typeface="Cambria Math" panose="02040503050406030204" pitchFamily="18" charset="0"/>
-                            <a:ea typeface="Cambria Math" panose="02040503050406030204" pitchFamily="18" charset="0"/>
-                          </a:rPr>
-                          <m:t>𝑅</m:t>
-                        </m:r>
-                      </m:e>
-                      <m:sub>
-                        <m:r>
-                          <a:rPr lang="en-GB" sz="3200" b="0" i="1" smtClean="0">
-                            <a:latin typeface="Cambria Math" panose="02040503050406030204" pitchFamily="18" charset="0"/>
-                            <a:ea typeface="Cambria Math" panose="02040503050406030204" pitchFamily="18" charset="0"/>
-                          </a:rPr>
-                          <m:t>𝑀</m:t>
-                        </m:r>
-                      </m:sub>
-                    </m:sSub>
-                  </m:oMath>
-                </a14:m>
-                <a:r>
-                  <a:rPr lang="en-GB" sz="3200" dirty="0" smtClean="0"/>
-                  <a:t> (the radius of curvature of the meniscus if it is a circular arc)</a:t>
-                </a:r>
+                <a:endParaRPr lang="en-US" sz="2000" dirty="0"/>
               </a:p>
             </p:txBody>
           </p:sp>
@@ -5218,10 +4536,14 @@
               </p:nvPr>
             </p:nvSpPr>
             <p:spPr>
+              <a:xfrm>
+                <a:off x="136864" y="751427"/>
+                <a:ext cx="5518212" cy="4351338"/>
+              </a:xfrm>
               <a:blipFill>
                 <a:blip r:embed="rId2"/>
                 <a:stretch>
-                  <a:fillRect l="-1101" t="-3641"/>
+                  <a:fillRect l="-1104" t="-1401"/>
                 </a:stretch>
               </a:blipFill>
             </p:spPr>
@@ -5230,7 +4552,7 @@
               <a:lstStyle/>
               <a:p>
                 <a:r>
-                  <a:rPr lang="en-US">
+                  <a:rPr lang="en-GB">
                     <a:noFill/>
                   </a:rPr>
                   <a:t> </a:t>
@@ -5240,23 +4562,442 @@
           </p:sp>
         </mc:Fallback>
       </mc:AlternateContent>
+      <mc:AlternateContent xmlns:mc="http://schemas.openxmlformats.org/markup-compatibility/2006">
+        <mc:Choice xmlns:a14="http://schemas.microsoft.com/office/drawing/2010/main" Requires="a14">
+          <p:sp>
+            <p:nvSpPr>
+              <p:cNvPr id="4" name="Rectangle 3">
+                <a:extLst>
+                  <a:ext uri="{FF2B5EF4-FFF2-40B4-BE49-F238E27FC236}">
+                    <a16:creationId xmlns:a16="http://schemas.microsoft.com/office/drawing/2014/main" id="{11C9B8AC-E7F7-4F53-B4E0-014F11418C84}"/>
+                  </a:ext>
+                </a:extLst>
+              </p:cNvPr>
+              <p:cNvSpPr/>
+              <p:nvPr/>
+            </p:nvSpPr>
+            <p:spPr>
+              <a:xfrm>
+                <a:off x="6356412" y="601735"/>
+                <a:ext cx="4394446" cy="565155"/>
+              </a:xfrm>
+              <a:prstGeom prst="rect">
+                <a:avLst/>
+              </a:prstGeom>
+            </p:spPr>
+            <p:txBody>
+              <a:bodyPr wrap="square">
+                <a:spAutoFit/>
+              </a:bodyPr>
+              <a:lstStyle/>
+              <a:p>
+                <a:r>
+                  <a:rPr lang="en-GB" sz="2000" b="1" dirty="0"/>
+                  <a:t>Curvature:	</a:t>
+                </a:r>
+                <a14:m>
+                  <m:oMath xmlns:m="http://schemas.openxmlformats.org/officeDocument/2006/math">
+                    <m:r>
+                      <a:rPr lang="en-GB" sz="2000" i="1">
+                        <a:latin typeface="Cambria Math" panose="02040503050406030204" pitchFamily="18" charset="0"/>
+                        <a:ea typeface="Cambria Math" panose="02040503050406030204" pitchFamily="18" charset="0"/>
+                      </a:rPr>
+                      <m:t>𝜅</m:t>
+                    </m:r>
+                    <m:r>
+                      <a:rPr lang="en-GB" sz="2000" i="1">
+                        <a:latin typeface="Cambria Math" panose="02040503050406030204" pitchFamily="18" charset="0"/>
+                        <a:ea typeface="Cambria Math" panose="02040503050406030204" pitchFamily="18" charset="0"/>
+                      </a:rPr>
+                      <m:t>=</m:t>
+                    </m:r>
+                    <m:f>
+                      <m:fPr>
+                        <m:ctrlPr>
+                          <a:rPr lang="en-GB" sz="2000" i="1">
+                            <a:latin typeface="Cambria Math" panose="02040503050406030204" pitchFamily="18" charset="0"/>
+                            <a:ea typeface="Cambria Math" panose="02040503050406030204" pitchFamily="18" charset="0"/>
+                          </a:rPr>
+                        </m:ctrlPr>
+                      </m:fPr>
+                      <m:num>
+                        <m:r>
+                          <a:rPr lang="en-GB" sz="2000" i="1">
+                            <a:latin typeface="Cambria Math" panose="02040503050406030204" pitchFamily="18" charset="0"/>
+                            <a:ea typeface="Cambria Math" panose="02040503050406030204" pitchFamily="18" charset="0"/>
+                          </a:rPr>
+                          <m:t>1</m:t>
+                        </m:r>
+                      </m:num>
+                      <m:den>
+                        <m:sSub>
+                          <m:sSubPr>
+                            <m:ctrlPr>
+                              <a:rPr lang="en-GB" sz="2000" i="1">
+                                <a:latin typeface="Cambria Math" panose="02040503050406030204" pitchFamily="18" charset="0"/>
+                                <a:ea typeface="Cambria Math" panose="02040503050406030204" pitchFamily="18" charset="0"/>
+                              </a:rPr>
+                            </m:ctrlPr>
+                          </m:sSubPr>
+                          <m:e>
+                            <m:r>
+                              <a:rPr lang="en-GB" sz="2000" i="1">
+                                <a:latin typeface="Cambria Math" panose="02040503050406030204" pitchFamily="18" charset="0"/>
+                                <a:ea typeface="Cambria Math" panose="02040503050406030204" pitchFamily="18" charset="0"/>
+                              </a:rPr>
+                              <m:t>𝑅</m:t>
+                            </m:r>
+                          </m:e>
+                          <m:sub>
+                            <m:r>
+                              <a:rPr lang="en-GB" sz="2000" i="1">
+                                <a:latin typeface="Cambria Math" panose="02040503050406030204" pitchFamily="18" charset="0"/>
+                                <a:ea typeface="Cambria Math" panose="02040503050406030204" pitchFamily="18" charset="0"/>
+                              </a:rPr>
+                              <m:t>𝑀</m:t>
+                            </m:r>
+                          </m:sub>
+                        </m:sSub>
+                      </m:den>
+                    </m:f>
+                  </m:oMath>
+                </a14:m>
+                <a:endParaRPr lang="en-GB" sz="2000" dirty="0"/>
+              </a:p>
+            </p:txBody>
+          </p:sp>
+        </mc:Choice>
+        <mc:Fallback>
+          <p:sp>
+            <p:nvSpPr>
+              <p:cNvPr id="4" name="Rectangle 3">
+                <a:extLst>
+                  <a:ext uri="{FF2B5EF4-FFF2-40B4-BE49-F238E27FC236}">
+                    <a16:creationId xmlns:a16="http://schemas.microsoft.com/office/drawing/2014/main" id="{11C9B8AC-E7F7-4F53-B4E0-014F11418C84}"/>
+                  </a:ext>
+                </a:extLst>
+              </p:cNvPr>
+              <p:cNvSpPr>
+                <a:spLocks noRot="1" noChangeAspect="1" noMove="1" noResize="1" noEditPoints="1" noAdjustHandles="1" noChangeArrowheads="1" noChangeShapeType="1" noTextEdit="1"/>
+              </p:cNvSpPr>
+              <p:nvPr/>
+            </p:nvSpPr>
+            <p:spPr>
+              <a:xfrm>
+                <a:off x="6356412" y="601735"/>
+                <a:ext cx="4394446" cy="565155"/>
+              </a:xfrm>
+              <a:prstGeom prst="rect">
+                <a:avLst/>
+              </a:prstGeom>
+              <a:blipFill>
+                <a:blip r:embed="rId3"/>
+                <a:stretch>
+                  <a:fillRect l="-1526" b="-2174"/>
+                </a:stretch>
+              </a:blipFill>
+            </p:spPr>
+            <p:txBody>
+              <a:bodyPr/>
+              <a:lstStyle/>
+              <a:p>
+                <a:r>
+                  <a:rPr lang="en-GB">
+                    <a:noFill/>
+                  </a:rPr>
+                  <a:t> </a:t>
+                </a:r>
+              </a:p>
+            </p:txBody>
+          </p:sp>
+        </mc:Fallback>
+      </mc:AlternateContent>
+      <p:pic>
+        <p:nvPicPr>
+          <p:cNvPr id="5" name="Picture 4">
+            <a:extLst>
+              <a:ext uri="{FF2B5EF4-FFF2-40B4-BE49-F238E27FC236}">
+                <a16:creationId xmlns:a16="http://schemas.microsoft.com/office/drawing/2014/main" id="{54576B29-E47F-4801-8776-589F33BAC936}"/>
+              </a:ext>
+            </a:extLst>
+          </p:cNvPr>
+          <p:cNvPicPr>
+            <a:picLocks noChangeAspect="1"/>
+          </p:cNvPicPr>
+          <p:nvPr/>
+        </p:nvPicPr>
+        <p:blipFill>
+          <a:blip r:embed="rId4"/>
+          <a:stretch>
+            <a:fillRect/>
+          </a:stretch>
+        </p:blipFill>
+        <p:spPr>
+          <a:xfrm>
+            <a:off x="408372" y="1465131"/>
+            <a:ext cx="11576481" cy="5394865"/>
+          </a:xfrm>
+          <a:prstGeom prst="rect">
+            <a:avLst/>
+          </a:prstGeom>
+        </p:spPr>
+      </p:pic>
+      <p:sp>
+        <p:nvSpPr>
+          <p:cNvPr id="6" name="TextBox 5">
+            <a:extLst>
+              <a:ext uri="{FF2B5EF4-FFF2-40B4-BE49-F238E27FC236}">
+                <a16:creationId xmlns:a16="http://schemas.microsoft.com/office/drawing/2014/main" id="{07DF9A32-FAEE-4F56-9998-61D6D89C84FA}"/>
+              </a:ext>
+            </a:extLst>
+          </p:cNvPr>
+          <p:cNvSpPr txBox="1"/>
+          <p:nvPr/>
+        </p:nvSpPr>
+        <p:spPr>
+          <a:xfrm>
+            <a:off x="7093258" y="5513033"/>
+            <a:ext cx="1526959" cy="369332"/>
+          </a:xfrm>
+          <a:prstGeom prst="rect">
+            <a:avLst/>
+          </a:prstGeom>
+          <a:noFill/>
+        </p:spPr>
+        <p:txBody>
+          <a:bodyPr wrap="square" rtlCol="0">
+            <a:spAutoFit/>
+          </a:bodyPr>
+          <a:lstStyle/>
+          <a:p>
+            <a:r>
+              <a:rPr lang="en-GB" dirty="0">
+                <a:solidFill>
+                  <a:srgbClr val="0000FF"/>
+                </a:solidFill>
+              </a:rPr>
+              <a:t>meniscus</a:t>
+            </a:r>
+          </a:p>
+        </p:txBody>
+      </p:sp>
+      <p:sp>
+        <p:nvSpPr>
+          <p:cNvPr id="7" name="TextBox 6">
+            <a:extLst>
+              <a:ext uri="{FF2B5EF4-FFF2-40B4-BE49-F238E27FC236}">
+                <a16:creationId xmlns:a16="http://schemas.microsoft.com/office/drawing/2014/main" id="{FE4B3E06-13E6-43BE-B820-2ADC7FF6DD81}"/>
+              </a:ext>
+            </a:extLst>
+          </p:cNvPr>
+          <p:cNvSpPr txBox="1"/>
+          <p:nvPr/>
+        </p:nvSpPr>
+        <p:spPr>
+          <a:xfrm>
+            <a:off x="9596021" y="3923930"/>
+            <a:ext cx="1526959" cy="646331"/>
+          </a:xfrm>
+          <a:prstGeom prst="rect">
+            <a:avLst/>
+          </a:prstGeom>
+          <a:noFill/>
+        </p:spPr>
+        <p:txBody>
+          <a:bodyPr wrap="square" rtlCol="0">
+            <a:spAutoFit/>
+          </a:bodyPr>
+          <a:lstStyle/>
+          <a:p>
+            <a:r>
+              <a:rPr lang="en-GB" dirty="0"/>
+              <a:t>Cross-section of fibre</a:t>
+            </a:r>
+          </a:p>
+        </p:txBody>
+      </p:sp>
+      <p:sp>
+        <p:nvSpPr>
+          <p:cNvPr id="8" name="TextBox 7">
+            <a:extLst>
+              <a:ext uri="{FF2B5EF4-FFF2-40B4-BE49-F238E27FC236}">
+                <a16:creationId xmlns:a16="http://schemas.microsoft.com/office/drawing/2014/main" id="{F64A58EF-007F-47DF-9F29-DC34B223CAE8}"/>
+              </a:ext>
+            </a:extLst>
+          </p:cNvPr>
+          <p:cNvSpPr txBox="1"/>
+          <p:nvPr/>
+        </p:nvSpPr>
+        <p:spPr>
+          <a:xfrm>
+            <a:off x="1299840" y="5498645"/>
+            <a:ext cx="1526959" cy="646331"/>
+          </a:xfrm>
+          <a:prstGeom prst="rect">
+            <a:avLst/>
+          </a:prstGeom>
+          <a:noFill/>
+        </p:spPr>
+        <p:txBody>
+          <a:bodyPr wrap="square" rtlCol="0">
+            <a:spAutoFit/>
+          </a:bodyPr>
+          <a:lstStyle/>
+          <a:p>
+            <a:r>
+              <a:rPr lang="en-GB" dirty="0"/>
+              <a:t>Cross-section of fibre</a:t>
+            </a:r>
+          </a:p>
+        </p:txBody>
+      </p:sp>
+      <p:sp>
+        <p:nvSpPr>
+          <p:cNvPr id="9" name="TextBox 8">
+            <a:extLst>
+              <a:ext uri="{FF2B5EF4-FFF2-40B4-BE49-F238E27FC236}">
+                <a16:creationId xmlns:a16="http://schemas.microsoft.com/office/drawing/2014/main" id="{BB1F8682-494C-41A1-A7B6-72F525BC1C14}"/>
+              </a:ext>
+            </a:extLst>
+          </p:cNvPr>
+          <p:cNvSpPr txBox="1"/>
+          <p:nvPr/>
+        </p:nvSpPr>
+        <p:spPr>
+          <a:xfrm>
+            <a:off x="6687107" y="1166890"/>
+            <a:ext cx="1866528" cy="923330"/>
+          </a:xfrm>
+          <a:prstGeom prst="rect">
+            <a:avLst/>
+          </a:prstGeom>
+          <a:noFill/>
+        </p:spPr>
+        <p:txBody>
+          <a:bodyPr wrap="square" rtlCol="0">
+            <a:spAutoFit/>
+          </a:bodyPr>
+          <a:lstStyle/>
+          <a:p>
+            <a:r>
+              <a:rPr lang="en-GB" dirty="0">
+                <a:solidFill>
+                  <a:schemeClr val="accent2"/>
+                </a:solidFill>
+              </a:rPr>
+              <a:t>Centre of curvature of meniscus</a:t>
+            </a:r>
+          </a:p>
+        </p:txBody>
+      </p:sp>
+      <p:sp>
+        <p:nvSpPr>
+          <p:cNvPr id="10" name="TextBox 9">
+            <a:extLst>
+              <a:ext uri="{FF2B5EF4-FFF2-40B4-BE49-F238E27FC236}">
+                <a16:creationId xmlns:a16="http://schemas.microsoft.com/office/drawing/2014/main" id="{E1C4893F-4265-4EBA-82A9-7D8B685FBA77}"/>
+              </a:ext>
+            </a:extLst>
+          </p:cNvPr>
+          <p:cNvSpPr txBox="1"/>
+          <p:nvPr/>
+        </p:nvSpPr>
+        <p:spPr>
+          <a:xfrm>
+            <a:off x="6196612" y="3729332"/>
+            <a:ext cx="1866528" cy="646331"/>
+          </a:xfrm>
+          <a:prstGeom prst="rect">
+            <a:avLst/>
+          </a:prstGeom>
+          <a:noFill/>
+        </p:spPr>
+        <p:txBody>
+          <a:bodyPr wrap="square" rtlCol="0">
+            <a:spAutoFit/>
+          </a:bodyPr>
+          <a:lstStyle/>
+          <a:p>
+            <a:r>
+              <a:rPr lang="en-GB" dirty="0">
+                <a:solidFill>
+                  <a:srgbClr val="DA1FFF"/>
+                </a:solidFill>
+              </a:rPr>
+              <a:t>Contact </a:t>
+            </a:r>
+            <a:br>
+              <a:rPr lang="en-GB" dirty="0">
+                <a:solidFill>
+                  <a:srgbClr val="DA1FFF"/>
+                </a:solidFill>
+              </a:rPr>
+            </a:br>
+            <a:r>
+              <a:rPr lang="en-GB" dirty="0">
+                <a:solidFill>
+                  <a:srgbClr val="DA1FFF"/>
+                </a:solidFill>
+              </a:rPr>
+              <a:t>angle</a:t>
+            </a:r>
+          </a:p>
+        </p:txBody>
+      </p:sp>
+      <p:cxnSp>
+        <p:nvCxnSpPr>
+          <p:cNvPr id="12" name="Straight Connector 11">
+            <a:extLst>
+              <a:ext uri="{FF2B5EF4-FFF2-40B4-BE49-F238E27FC236}">
+                <a16:creationId xmlns:a16="http://schemas.microsoft.com/office/drawing/2014/main" id="{68C90C85-0B7E-483D-A789-0BD709BF9407}"/>
+              </a:ext>
+            </a:extLst>
+          </p:cNvPr>
+          <p:cNvCxnSpPr>
+            <a:cxnSpLocks/>
+            <a:stCxn id="10" idx="1"/>
+          </p:cNvCxnSpPr>
+          <p:nvPr/>
+        </p:nvCxnSpPr>
+        <p:spPr>
+          <a:xfrm flipH="1">
+            <a:off x="3568824" y="4052498"/>
+            <a:ext cx="2627788" cy="324193"/>
+          </a:xfrm>
+          <a:prstGeom prst="line">
+            <a:avLst/>
+          </a:prstGeom>
+          <a:ln>
+            <a:solidFill>
+              <a:srgbClr val="DA1FFF"/>
+            </a:solidFill>
+          </a:ln>
+        </p:spPr>
+        <p:style>
+          <a:lnRef idx="1">
+            <a:schemeClr val="accent1"/>
+          </a:lnRef>
+          <a:fillRef idx="0">
+            <a:schemeClr val="accent1"/>
+          </a:fillRef>
+          <a:effectRef idx="0">
+            <a:schemeClr val="accent1"/>
+          </a:effectRef>
+          <a:fontRef idx="minor">
+            <a:schemeClr val="tx1"/>
+          </a:fontRef>
+        </p:style>
+      </p:cxnSp>
     </p:spTree>
     <p:extLst>
       <p:ext uri="{BB962C8B-B14F-4D97-AF65-F5344CB8AC3E}">
-        <p14:creationId xmlns:p14="http://schemas.microsoft.com/office/powerpoint/2010/main" val="1628294175"/>
+        <p14:creationId xmlns:p14="http://schemas.microsoft.com/office/powerpoint/2010/main" val="3508233569"/>
       </p:ext>
     </p:extLst>
   </p:cSld>
   <p:clrMapOvr>
     <a:masterClrMapping/>
   </p:clrMapOvr>
-  <p:timing>
-    <p:tnLst>
-      <p:par>
-        <p:cTn id="1" dur="indefinite" restart="never" nodeType="tmRoot"/>
-      </p:par>
-    </p:tnLst>
-  </p:timing>
 </p:sld>
 </file>
 
@@ -5293,8 +5034,8 @@
           <a:lstStyle/>
           <a:p>
             <a:r>
-              <a:rPr lang="en-GB" b="1" dirty="0" smtClean="0"/>
-              <a:t>Main parameters</a:t>
+              <a:rPr lang="en-GB" b="1" dirty="0"/>
+              <a:t>Parameters and variables</a:t>
             </a:r>
             <a:endParaRPr lang="en-US" b="1" dirty="0"/>
           </a:p>
@@ -5315,20 +5056,171 @@
             <p:spPr/>
             <p:txBody>
               <a:bodyPr>
-                <a:normAutofit/>
+                <a:normAutofit fontScale="92500"/>
               </a:bodyPr>
               <a:lstStyle/>
+              <a:p>
+                <a:pPr marL="0" indent="0">
+                  <a:buNone/>
+                </a:pPr>
+                <a:r>
+                  <a:rPr lang="en-GB" sz="3200" b="1" dirty="0"/>
+                  <a:t>Variables</a:t>
+                </a:r>
+              </a:p>
               <a:p>
                 <a14:m>
                   <m:oMath xmlns:m="http://schemas.openxmlformats.org/officeDocument/2006/math">
                     <m:r>
-                      <a:rPr lang="en-GB" sz="3600" b="0" i="1" smtClean="0">
+                      <a:rPr lang="en-GB" sz="3200" b="0" i="1" smtClean="0">
+                        <a:latin typeface="Cambria Math" panose="02040503050406030204" pitchFamily="18" charset="0"/>
+                      </a:rPr>
+                      <m:t>𝛼</m:t>
+                    </m:r>
+                  </m:oMath>
+                </a14:m>
+                <a:r>
+                  <a:rPr lang="en-GB" sz="3200" dirty="0">
+                    <a:latin typeface="Cambria Math" panose="02040503050406030204" pitchFamily="18" charset="0"/>
+                  </a:rPr>
+                  <a:t> – angle of inclination of contact point</a:t>
+                </a:r>
+              </a:p>
+              <a:p>
+                <a14:m>
+                  <m:oMath xmlns:m="http://schemas.openxmlformats.org/officeDocument/2006/math">
+                    <m:sSub>
+                      <m:sSubPr>
+                        <m:ctrlPr>
+                          <a:rPr lang="en-GB" sz="3200" b="0" i="1" smtClean="0">
+                            <a:latin typeface="Cambria Math" panose="02040503050406030204" pitchFamily="18" charset="0"/>
+                          </a:rPr>
+                        </m:ctrlPr>
+                      </m:sSubPr>
+                      <m:e>
+                        <m:r>
+                          <a:rPr lang="en-GB" sz="3200" b="0" i="1" smtClean="0">
+                            <a:latin typeface="Cambria Math" panose="02040503050406030204" pitchFamily="18" charset="0"/>
+                          </a:rPr>
+                          <m:t>𝑅</m:t>
+                        </m:r>
+                      </m:e>
+                      <m:sub>
+                        <m:r>
+                          <a:rPr lang="en-GB" sz="3200" b="0" i="1" smtClean="0">
+                            <a:latin typeface="Cambria Math" panose="02040503050406030204" pitchFamily="18" charset="0"/>
+                          </a:rPr>
+                          <m:t>𝑀</m:t>
+                        </m:r>
+                      </m:sub>
+                    </m:sSub>
+                    <m:r>
+                      <a:rPr lang="en-GB" sz="3200" b="0" i="1" smtClean="0">
+                        <a:latin typeface="Cambria Math" panose="02040503050406030204" pitchFamily="18" charset="0"/>
+                      </a:rPr>
+                      <m:t>=</m:t>
+                    </m:r>
+                    <m:sSub>
+                      <m:sSubPr>
+                        <m:ctrlPr>
+                          <a:rPr lang="en-GB" sz="3200" b="0" i="1" smtClean="0">
+                            <a:latin typeface="Cambria Math" panose="02040503050406030204" pitchFamily="18" charset="0"/>
+                          </a:rPr>
+                        </m:ctrlPr>
+                      </m:sSubPr>
+                      <m:e>
+                        <m:r>
+                          <a:rPr lang="en-GB" sz="3200" b="0" i="1" smtClean="0">
+                            <a:latin typeface="Cambria Math" panose="02040503050406030204" pitchFamily="18" charset="0"/>
+                          </a:rPr>
+                          <m:t>𝑅</m:t>
+                        </m:r>
+                      </m:e>
+                      <m:sub>
+                        <m:r>
+                          <a:rPr lang="en-GB" sz="3200" b="0" i="1" smtClean="0">
+                            <a:latin typeface="Cambria Math" panose="02040503050406030204" pitchFamily="18" charset="0"/>
+                          </a:rPr>
+                          <m:t>𝑀</m:t>
+                        </m:r>
+                      </m:sub>
+                    </m:sSub>
+                    <m:r>
+                      <a:rPr lang="en-GB" sz="3200" b="0" i="1" smtClean="0">
+                        <a:latin typeface="Cambria Math" panose="02040503050406030204" pitchFamily="18" charset="0"/>
+                      </a:rPr>
+                      <m:t>(</m:t>
+                    </m:r>
+                    <m:r>
+                      <a:rPr lang="en-GB" sz="3200" b="0" i="1" smtClean="0">
+                        <a:latin typeface="Cambria Math" panose="02040503050406030204" pitchFamily="18" charset="0"/>
+                      </a:rPr>
+                      <m:t>𝛼</m:t>
+                    </m:r>
+                    <m:r>
+                      <a:rPr lang="en-GB" sz="3200" b="0" i="1" smtClean="0">
+                        <a:latin typeface="Cambria Math" panose="02040503050406030204" pitchFamily="18" charset="0"/>
+                      </a:rPr>
+                      <m:t>)</m:t>
+                    </m:r>
+                  </m:oMath>
+                </a14:m>
+                <a:r>
+                  <a:rPr lang="en-GB" sz="3200" dirty="0">
+                    <a:latin typeface="Cambria Math" panose="02040503050406030204" pitchFamily="18" charset="0"/>
+                  </a:rPr>
+                  <a:t> – radius of curvature of meniscus (a circular arc)</a:t>
+                </a:r>
+              </a:p>
+              <a:p>
+                <a:pPr marL="0" indent="0">
+                  <a:buNone/>
+                </a:pPr>
+                <a:r>
+                  <a:rPr lang="en-GB" sz="3200" b="1" dirty="0">
+                    <a:latin typeface="+mj-lt"/>
+                  </a:rPr>
+                  <a:t>Parameters</a:t>
+                </a:r>
+              </a:p>
+              <a:p>
+                <a14:m>
+                  <m:oMath xmlns:m="http://schemas.openxmlformats.org/officeDocument/2006/math">
+                    <m:r>
+                      <a:rPr lang="en-GB" sz="3200" b="0" i="1" smtClean="0">
+                        <a:latin typeface="Cambria Math" panose="02040503050406030204" pitchFamily="18" charset="0"/>
+                      </a:rPr>
+                      <m:t>𝜃</m:t>
+                    </m:r>
+                  </m:oMath>
+                </a14:m>
+                <a:r>
+                  <a:rPr lang="en-GB" sz="3200" b="0" i="1" dirty="0">
+                    <a:latin typeface="Cambria Math" panose="02040503050406030204" pitchFamily="18" charset="0"/>
+                  </a:rPr>
+                  <a:t> </a:t>
+                </a:r>
+                <a:r>
+                  <a:rPr lang="en-GB" sz="3200" dirty="0">
+                    <a:latin typeface="Cambria Math" panose="02040503050406030204" pitchFamily="18" charset="0"/>
+                  </a:rPr>
+                  <a:t>– contact angle between the fibre and the meniscus</a:t>
+                </a:r>
+                <a:endParaRPr lang="en-GB" sz="3200" b="0" i="1" dirty="0">
+                  <a:latin typeface="Cambria Math" panose="02040503050406030204" pitchFamily="18" charset="0"/>
+                </a:endParaRPr>
+              </a:p>
+              <a:p>
+                <a14:m>
+                  <m:oMath xmlns:m="http://schemas.openxmlformats.org/officeDocument/2006/math">
+                    <m:r>
+                      <a:rPr lang="en-GB" sz="3200" b="0" i="1" smtClean="0">
                         <a:latin typeface="Cambria Math" panose="02040503050406030204" pitchFamily="18" charset="0"/>
                       </a:rPr>
                       <m:t>𝛾</m:t>
                     </m:r>
                     <m:r>
-                      <a:rPr lang="en-GB" sz="3600" b="0" i="1" smtClean="0">
+                      <a:rPr lang="en-GB" sz="3200" b="0" i="1" smtClean="0">
                         <a:latin typeface="Cambria Math" panose="02040503050406030204" pitchFamily="18" charset="0"/>
                       </a:rPr>
                       <m:t>=7×</m:t>
@@ -5336,14 +5228,14 @@
                     <m:sSup>
                       <m:sSupPr>
                         <m:ctrlPr>
-                          <a:rPr lang="en-GB" sz="3600" b="0" i="1" smtClean="0">
+                          <a:rPr lang="en-GB" sz="3200" b="0" i="1" smtClean="0">
                             <a:latin typeface="Cambria Math" panose="02040503050406030204" pitchFamily="18" charset="0"/>
                           </a:rPr>
                         </m:ctrlPr>
                       </m:sSupPr>
                       <m:e>
                         <m:r>
-                          <a:rPr lang="en-GB" sz="3600" b="0" i="1" smtClean="0">
+                          <a:rPr lang="en-GB" sz="3200" b="0" i="1" smtClean="0">
                             <a:latin typeface="Cambria Math" panose="02040503050406030204" pitchFamily="18" charset="0"/>
                           </a:rPr>
                           <m:t>10</m:t>
@@ -5351,7 +5243,7 @@
                       </m:e>
                       <m:sup>
                         <m:r>
-                          <a:rPr lang="en-GB" sz="3600" b="0" i="1" smtClean="0">
+                          <a:rPr lang="en-GB" sz="3200" b="0" i="1" smtClean="0">
                             <a:latin typeface="Cambria Math" panose="02040503050406030204" pitchFamily="18" charset="0"/>
                           </a:rPr>
                           <m:t>−2</m:t>
@@ -5362,13 +5254,13 @@
                       <m:rPr>
                         <m:sty m:val="p"/>
                       </m:rPr>
-                      <a:rPr lang="en-GB" sz="3600" b="0" i="0" smtClean="0">
+                      <a:rPr lang="en-GB" sz="3200" b="0" i="0" smtClean="0">
                         <a:latin typeface="Cambria Math" panose="02040503050406030204" pitchFamily="18" charset="0"/>
                       </a:rPr>
                       <m:t>N</m:t>
                     </m:r>
                     <m:r>
-                      <a:rPr lang="en-GB" sz="3600" b="0" i="0" smtClean="0">
+                      <a:rPr lang="en-GB" sz="3200" b="0" i="0" smtClean="0">
                         <a:latin typeface="Cambria Math" panose="02040503050406030204" pitchFamily="18" charset="0"/>
                       </a:rPr>
                       <m:t>/</m:t>
@@ -5377,7 +5269,7 @@
                       <m:rPr>
                         <m:sty m:val="p"/>
                       </m:rPr>
-                      <a:rPr lang="en-GB" sz="3600" b="0" i="0" smtClean="0">
+                      <a:rPr lang="en-GB" sz="3200" b="0" i="0" smtClean="0">
                         <a:latin typeface="Cambria Math" panose="02040503050406030204" pitchFamily="18" charset="0"/>
                       </a:rPr>
                       <m:t>m</m:t>
@@ -5385,37 +5277,33 @@
                   </m:oMath>
                 </a14:m>
                 <a:r>
-                  <a:rPr lang="en-US" sz="3600" dirty="0" smtClean="0"/>
+                  <a:rPr lang="en-US" sz="3200" dirty="0"/>
                   <a:t> – surface tension constant</a:t>
                 </a:r>
-                <a:br>
-                  <a:rPr lang="en-US" sz="3600" dirty="0" smtClean="0"/>
-                </a:br>
-                <a:endParaRPr lang="en-US" sz="3600" dirty="0" smtClean="0"/>
               </a:p>
               <a:p>
                 <a14:m>
                   <m:oMath xmlns:m="http://schemas.openxmlformats.org/officeDocument/2006/math">
                     <m:r>
-                      <a:rPr lang="en-GB" sz="3600" b="0" i="1" smtClean="0">
+                      <a:rPr lang="en-GB" sz="3200" b="0" i="1" smtClean="0">
                         <a:latin typeface="Cambria Math" panose="02040503050406030204" pitchFamily="18" charset="0"/>
                       </a:rPr>
                       <m:t>ℓ</m:t>
                     </m:r>
                     <m:r>
-                      <a:rPr lang="en-GB" sz="3600" i="1">
+                      <a:rPr lang="en-GB" sz="3200" i="1">
                         <a:latin typeface="Cambria Math" panose="02040503050406030204" pitchFamily="18" charset="0"/>
                       </a:rPr>
                       <m:t>=</m:t>
                     </m:r>
                     <m:r>
-                      <a:rPr lang="en-GB" sz="3600" b="0" i="1" smtClean="0">
+                      <a:rPr lang="en-GB" sz="3200" b="0" i="1" smtClean="0">
                         <a:latin typeface="Cambria Math" panose="02040503050406030204" pitchFamily="18" charset="0"/>
                       </a:rPr>
                       <m:t>5</m:t>
                     </m:r>
                     <m:r>
-                      <a:rPr lang="en-GB" sz="3600" i="1">
+                      <a:rPr lang="en-GB" sz="3200" i="1">
                         <a:latin typeface="Cambria Math" panose="02040503050406030204" pitchFamily="18" charset="0"/>
                       </a:rPr>
                       <m:t>×</m:t>
@@ -5423,14 +5311,14 @@
                     <m:sSup>
                       <m:sSupPr>
                         <m:ctrlPr>
-                          <a:rPr lang="en-GB" sz="3600" i="1">
+                          <a:rPr lang="en-GB" sz="3200" i="1">
                             <a:latin typeface="Cambria Math" panose="02040503050406030204" pitchFamily="18" charset="0"/>
                           </a:rPr>
                         </m:ctrlPr>
                       </m:sSupPr>
                       <m:e>
                         <m:r>
-                          <a:rPr lang="en-GB" sz="3600" i="1">
+                          <a:rPr lang="en-GB" sz="3200" i="1">
                             <a:latin typeface="Cambria Math" panose="02040503050406030204" pitchFamily="18" charset="0"/>
                           </a:rPr>
                           <m:t>10</m:t>
@@ -5438,13 +5326,13 @@
                       </m:e>
                       <m:sup>
                         <m:r>
-                          <a:rPr lang="en-GB" sz="3600" i="1">
+                          <a:rPr lang="en-GB" sz="3200" i="1">
                             <a:latin typeface="Cambria Math" panose="02040503050406030204" pitchFamily="18" charset="0"/>
                           </a:rPr>
                           <m:t>−</m:t>
                         </m:r>
                         <m:r>
-                          <a:rPr lang="en-GB" sz="3600" b="0" i="1" smtClean="0">
+                          <a:rPr lang="en-GB" sz="3200" b="0" i="1" smtClean="0">
                             <a:latin typeface="Cambria Math" panose="02040503050406030204" pitchFamily="18" charset="0"/>
                           </a:rPr>
                           <m:t>6</m:t>
@@ -5452,7 +5340,7 @@
                       </m:sup>
                     </m:sSup>
                     <m:r>
-                      <a:rPr lang="en-GB" sz="3600" b="0" i="0" smtClean="0">
+                      <a:rPr lang="en-GB" sz="3200" b="0" i="0" smtClean="0">
                         <a:latin typeface="Cambria Math" panose="02040503050406030204" pitchFamily="18" charset="0"/>
                       </a:rPr>
                       <m:t> </m:t>
@@ -5461,7 +5349,7 @@
                       <m:rPr>
                         <m:sty m:val="p"/>
                       </m:rPr>
-                      <a:rPr lang="en-GB" sz="3600">
+                      <a:rPr lang="en-GB" sz="3200">
                         <a:latin typeface="Cambria Math" panose="02040503050406030204" pitchFamily="18" charset="0"/>
                       </a:rPr>
                       <m:t>m</m:t>
@@ -5469,45 +5357,34 @@
                   </m:oMath>
                 </a14:m>
                 <a:r>
-                  <a:rPr lang="en-US" sz="3600" dirty="0"/>
-                  <a:t> – </a:t>
+                  <a:rPr lang="en-US" sz="3200" dirty="0"/>
+                  <a:t> – distance between </a:t>
                 </a:r>
                 <a:r>
-                  <a:rPr lang="en-US" sz="3600" dirty="0" smtClean="0"/>
-                  <a:t>distance between </a:t>
-                </a:r>
-                <a:r>
-                  <a:rPr lang="en-US" sz="3600" dirty="0" err="1" smtClean="0"/>
+                  <a:rPr lang="en-US" sz="3200" dirty="0" err="1"/>
                   <a:t>centres</a:t>
                 </a:r>
                 <a:r>
-                  <a:rPr lang="en-US" sz="3600" dirty="0" smtClean="0"/>
+                  <a:rPr lang="en-US" sz="3200" dirty="0"/>
                   <a:t> of the </a:t>
                 </a:r>
                 <a:r>
-                  <a:rPr lang="en-US" sz="3600" dirty="0" err="1" smtClean="0"/>
+                  <a:rPr lang="en-US" sz="3200" dirty="0" err="1"/>
                   <a:t>fibres</a:t>
                 </a:r>
-                <a:r>
-                  <a:rPr lang="en-US" sz="3600" dirty="0" smtClean="0"/>
-                  <a:t/>
-                </a:r>
-                <a:br>
-                  <a:rPr lang="en-US" sz="3600" dirty="0" smtClean="0"/>
-                </a:br>
-                <a:endParaRPr lang="en-US" sz="3600" dirty="0" smtClean="0"/>
+                <a:endParaRPr lang="en-US" sz="3200" dirty="0"/>
               </a:p>
               <a:p>
                 <a14:m>
                   <m:oMath xmlns:m="http://schemas.openxmlformats.org/officeDocument/2006/math">
                     <m:r>
-                      <a:rPr lang="en-GB" sz="3600" b="0" i="1" smtClean="0">
+                      <a:rPr lang="en-GB" sz="3200" b="0" i="1" smtClean="0">
                         <a:latin typeface="Cambria Math" panose="02040503050406030204" pitchFamily="18" charset="0"/>
                       </a:rPr>
                       <m:t>𝜌</m:t>
                     </m:r>
                     <m:r>
-                      <a:rPr lang="en-GB" sz="3600" b="0" i="1" smtClean="0">
+                      <a:rPr lang="en-GB" sz="3200" b="0" i="1" smtClean="0">
                         <a:latin typeface="Cambria Math" panose="02040503050406030204" pitchFamily="18" charset="0"/>
                       </a:rPr>
                       <m:t>=997</m:t>
@@ -5515,7 +5392,7 @@
                   </m:oMath>
                 </a14:m>
                 <a:r>
-                  <a:rPr lang="en-GB" sz="3600" dirty="0"/>
+                  <a:rPr lang="en-GB" sz="3200" dirty="0"/>
                   <a:t> </a:t>
                 </a:r>
                 <a14:m>
@@ -5524,13 +5401,13 @@
                       <m:rPr>
                         <m:sty m:val="p"/>
                       </m:rPr>
-                      <a:rPr lang="en-GB" sz="3600" b="0" i="0" smtClean="0">
+                      <a:rPr lang="en-GB" sz="3200" b="0" i="0" smtClean="0">
                         <a:latin typeface="Cambria Math" panose="02040503050406030204" pitchFamily="18" charset="0"/>
                       </a:rPr>
                       <m:t>kg</m:t>
                     </m:r>
                     <m:r>
-                      <a:rPr lang="en-GB" sz="3600" b="0" i="0" smtClean="0">
+                      <a:rPr lang="en-GB" sz="3200" b="0" i="0" smtClean="0">
                         <a:latin typeface="Cambria Math" panose="02040503050406030204" pitchFamily="18" charset="0"/>
                       </a:rPr>
                       <m:t>/</m:t>
@@ -5538,7 +5415,7 @@
                     <m:sSup>
                       <m:sSupPr>
                         <m:ctrlPr>
-                          <a:rPr lang="en-GB" sz="3600" b="0" i="0" smtClean="0">
+                          <a:rPr lang="en-GB" sz="3200" b="0" i="1" smtClean="0">
                             <a:latin typeface="Cambria Math" panose="02040503050406030204" pitchFamily="18" charset="0"/>
                           </a:rPr>
                         </m:ctrlPr>
@@ -5548,7 +5425,7 @@
                           <m:rPr>
                             <m:sty m:val="p"/>
                           </m:rPr>
-                          <a:rPr lang="en-GB" sz="3600">
+                          <a:rPr lang="en-GB" sz="3200">
                             <a:latin typeface="Cambria Math" panose="02040503050406030204" pitchFamily="18" charset="0"/>
                           </a:rPr>
                           <m:t>m</m:t>
@@ -5556,7 +5433,7 @@
                       </m:e>
                       <m:sup>
                         <m:r>
-                          <a:rPr lang="en-GB" sz="3600" b="0" i="0" smtClean="0">
+                          <a:rPr lang="en-GB" sz="3200" b="0" i="0" smtClean="0">
                             <a:latin typeface="Cambria Math" panose="02040503050406030204" pitchFamily="18" charset="0"/>
                           </a:rPr>
                           <m:t>3</m:t>
@@ -5566,15 +5443,18 @@
                   </m:oMath>
                 </a14:m>
                 <a:r>
-                  <a:rPr lang="en-US" sz="3600" dirty="0" smtClean="0"/>
+                  <a:rPr lang="en-US" sz="3200" dirty="0"/>
                   <a:t> - density of water</a:t>
                 </a:r>
               </a:p>
               <a:p>
-                <a:endParaRPr lang="en-US" sz="3600" dirty="0" smtClean="0"/>
+                <a:pPr marL="0" indent="0">
+                  <a:buNone/>
+                </a:pPr>
+                <a:endParaRPr lang="en-US" sz="3200" dirty="0"/>
               </a:p>
               <a:p>
-                <a:endParaRPr lang="en-US" sz="3600" dirty="0"/>
+                <a:endParaRPr lang="en-US" sz="3200" dirty="0"/>
               </a:p>
             </p:txBody>
           </p:sp>
@@ -5594,7 +5474,7 @@
               <a:blipFill>
                 <a:blip r:embed="rId2"/>
                 <a:stretch>
-                  <a:fillRect t="-3221"/>
+                  <a:fillRect l="-1391" t="-2801" r="-870" b="-2661"/>
                 </a:stretch>
               </a:blipFill>
             </p:spPr>
@@ -5603,7 +5483,7 @@
               <a:lstStyle/>
               <a:p>
                 <a:r>
-                  <a:rPr lang="en-US">
+                  <a:rPr lang="en-GB">
                     <a:noFill/>
                   </a:rPr>
                   <a:t> </a:t>
@@ -5623,13 +5503,6 @@
   <p:clrMapOvr>
     <a:masterClrMapping/>
   </p:clrMapOvr>
-  <p:timing>
-    <p:tnLst>
-      <p:par>
-        <p:cTn id="1" dur="indefinite" restart="never" nodeType="tmRoot"/>
-      </p:par>
-    </p:tnLst>
-  </p:timing>
 </p:sld>
 </file>
 
@@ -5666,7 +5539,7 @@
           <a:lstStyle/>
           <a:p>
             <a:r>
-              <a:rPr lang="en-GB" b="1" dirty="0" smtClean="0"/>
+              <a:rPr lang="en-GB" b="1" dirty="0"/>
               <a:t>Governing equations</a:t>
             </a:r>
             <a:endParaRPr lang="en-US" b="1" dirty="0"/>
@@ -6129,13 +6002,6 @@
   <p:clrMapOvr>
     <a:masterClrMapping/>
   </p:clrMapOvr>
-  <p:timing>
-    <p:tnLst>
-      <p:par>
-        <p:cTn id="1" dur="indefinite" restart="never" nodeType="tmRoot"/>
-      </p:par>
-    </p:tnLst>
-  </p:timing>
 </p:sld>
 </file>
 
@@ -6156,107 +6022,8 @@
           <a:chExt cx="0" cy="0"/>
         </a:xfrm>
       </p:grpSpPr>
-      <p:sp>
-        <p:nvSpPr>
-          <p:cNvPr id="2" name="Title 1"/>
-          <p:cNvSpPr>
-            <a:spLocks noGrp="1"/>
-          </p:cNvSpPr>
-          <p:nvPr>
-            <p:ph type="title"/>
-          </p:nvPr>
-        </p:nvSpPr>
-        <p:spPr/>
-        <p:txBody>
-          <a:bodyPr/>
-          <a:lstStyle/>
-          <a:p>
-            <a:endParaRPr lang="en-US"/>
-          </a:p>
-        </p:txBody>
-      </p:sp>
-      <p:pic>
-        <p:nvPicPr>
-          <p:cNvPr id="2050" name="Picture 2" descr="test.jpg"/>
-          <p:cNvPicPr>
-            <a:picLocks noGrp="1" noChangeAspect="1" noChangeArrowheads="1"/>
-          </p:cNvPicPr>
-          <p:nvPr>
-            <p:ph idx="1"/>
-          </p:nvPr>
-        </p:nvPicPr>
-        <p:blipFill>
-          <a:blip r:embed="rId2">
-            <a:extLst>
-              <a:ext uri="{28A0092B-C50C-407E-A947-70E740481C1C}">
-                <a14:useLocalDpi xmlns:a14="http://schemas.microsoft.com/office/drawing/2010/main" val="0"/>
-              </a:ext>
-            </a:extLst>
-          </a:blip>
-          <a:srcRect/>
-          <a:stretch>
-            <a:fillRect/>
-          </a:stretch>
-        </p:blipFill>
-        <p:spPr bwMode="auto">
-          <a:xfrm>
-            <a:off x="-761568" y="0"/>
-            <a:ext cx="13358793" cy="7112000"/>
-          </a:xfrm>
-          <a:prstGeom prst="rect">
-            <a:avLst/>
-          </a:prstGeom>
-          <a:noFill/>
-          <a:extLst>
-            <a:ext uri="{909E8E84-426E-40DD-AFC4-6F175D3DCCD1}">
-              <a14:hiddenFill xmlns:a14="http://schemas.microsoft.com/office/drawing/2010/main">
-                <a:solidFill>
-                  <a:srgbClr val="FFFFFF"/>
-                </a:solidFill>
-              </a14:hiddenFill>
-            </a:ext>
-          </a:extLst>
-        </p:spPr>
-      </p:pic>
-    </p:spTree>
-    <p:extLst>
-      <p:ext uri="{BB962C8B-B14F-4D97-AF65-F5344CB8AC3E}">
-        <p14:creationId xmlns:p14="http://schemas.microsoft.com/office/powerpoint/2010/main" val="2239077893"/>
-      </p:ext>
-    </p:extLst>
-  </p:cSld>
-  <p:clrMapOvr>
-    <a:masterClrMapping/>
-  </p:clrMapOvr>
-  <p:timing>
-    <p:tnLst>
-      <p:par>
-        <p:cTn id="1" dur="indefinite" restart="never" nodeType="tmRoot"/>
-      </p:par>
-    </p:tnLst>
-  </p:timing>
-</p:sld>
-</file>
-
-<file path=ppt/slides/slide9.xml><?xml version="1.0" encoding="utf-8"?>
-<p:sld xmlns:a="http://schemas.openxmlformats.org/drawingml/2006/main" xmlns:r="http://schemas.openxmlformats.org/officeDocument/2006/relationships" xmlns:p="http://schemas.openxmlformats.org/presentationml/2006/main">
-  <p:cSld>
-    <p:spTree>
-      <p:nvGrpSpPr>
-        <p:cNvPr id="1" name=""/>
-        <p:cNvGrpSpPr/>
-        <p:nvPr/>
-      </p:nvGrpSpPr>
-      <p:grpSpPr>
-        <a:xfrm>
-          <a:off x="0" y="0"/>
-          <a:ext cx="0" cy="0"/>
-          <a:chOff x="0" y="0"/>
-          <a:chExt cx="0" cy="0"/>
-        </a:xfrm>
-      </p:grpSpPr>
-      <mc:AlternateContent xmlns:mc="http://schemas.openxmlformats.org/markup-compatibility/2006">
-        <mc:Choice xmlns:a14="http://schemas.microsoft.com/office/drawing/2010/main" Requires="a14">
+      <mc:AlternateContent xmlns:mc="http://schemas.openxmlformats.org/markup-compatibility/2006" xmlns:a14="http://schemas.microsoft.com/office/drawing/2010/main">
+        <mc:Choice Requires="a14">
           <p:sp>
             <p:nvSpPr>
               <p:cNvPr id="5" name="Content Placeholder 4"/>
@@ -6322,7 +6089,7 @@
                   </m:oMath>
                 </a14:m>
                 <a:r>
-                  <a:rPr lang="en-GB" b="0" dirty="0" smtClean="0"/>
+                  <a:rPr lang="en-GB" b="0" dirty="0"/>
                   <a:t> </a:t>
                 </a:r>
                 <a14:m>
@@ -6357,12 +6124,11 @@
                   <a:rPr lang="en-US" dirty="0"/>
                   <a:t> </a:t>
                 </a:r>
-                <a:endParaRPr lang="en-US" dirty="0" smtClean="0"/>
               </a:p>
             </p:txBody>
           </p:sp>
         </mc:Choice>
-        <mc:Fallback>
+        <mc:Fallback xmlns="">
           <p:sp>
             <p:nvSpPr>
               <p:cNvPr id="5" name="Content Placeholder 4"/>
@@ -6481,8 +6247,8 @@
           </p:txBody>
         </p:sp>
       </p:grpSp>
-      <mc:AlternateContent xmlns:mc="http://schemas.openxmlformats.org/markup-compatibility/2006">
-        <mc:Choice xmlns:a14="http://schemas.microsoft.com/office/drawing/2010/main" Requires="a14">
+      <mc:AlternateContent xmlns:mc="http://schemas.openxmlformats.org/markup-compatibility/2006" xmlns:a14="http://schemas.microsoft.com/office/drawing/2010/main">
+        <mc:Choice Requires="a14">
           <p:sp>
             <p:nvSpPr>
               <p:cNvPr id="23" name="Title 1"/>
@@ -6555,7 +6321,7 @@
             </p:txBody>
           </p:sp>
         </mc:Choice>
-        <mc:Fallback>
+        <mc:Fallback xmlns="">
           <p:sp>
             <p:nvSpPr>
               <p:cNvPr id="23" name="Title 1"/>
@@ -6651,13 +6417,550 @@
   <p:clrMapOvr>
     <a:masterClrMapping/>
   </p:clrMapOvr>
-  <p:timing>
-    <p:tnLst>
-      <p:par>
-        <p:cTn id="1" dur="indefinite" restart="never" nodeType="tmRoot"/>
-      </p:par>
-    </p:tnLst>
-  </p:timing>
+</p:sld>
+</file>
+
+<file path=ppt/slides/slide9.xml><?xml version="1.0" encoding="utf-8"?>
+<p:sld xmlns:a="http://schemas.openxmlformats.org/drawingml/2006/main" xmlns:r="http://schemas.openxmlformats.org/officeDocument/2006/relationships" xmlns:p="http://schemas.openxmlformats.org/presentationml/2006/main">
+  <p:cSld>
+    <p:spTree>
+      <p:nvGrpSpPr>
+        <p:cNvPr id="1" name=""/>
+        <p:cNvGrpSpPr/>
+        <p:nvPr/>
+      </p:nvGrpSpPr>
+      <p:grpSpPr>
+        <a:xfrm>
+          <a:off x="0" y="0"/>
+          <a:ext cx="0" cy="0"/>
+          <a:chOff x="0" y="0"/>
+          <a:chExt cx="0" cy="0"/>
+        </a:xfrm>
+      </p:grpSpPr>
+      <p:sp>
+        <p:nvSpPr>
+          <p:cNvPr id="5" name="Content Placeholder 4"/>
+          <p:cNvSpPr>
+            <a:spLocks noGrp="1"/>
+          </p:cNvSpPr>
+          <p:nvPr>
+            <p:ph idx="1"/>
+          </p:nvPr>
+        </p:nvSpPr>
+        <p:spPr/>
+        <p:txBody>
+          <a:bodyPr/>
+          <a:lstStyle/>
+          <a:p>
+            <a:endParaRPr lang="en-US" dirty="0"/>
+          </a:p>
+        </p:txBody>
+      </p:sp>
+      <p:pic>
+        <p:nvPicPr>
+          <p:cNvPr id="4" name="Picture 3"/>
+          <p:cNvPicPr>
+            <a:picLocks noChangeAspect="1"/>
+          </p:cNvPicPr>
+          <p:nvPr/>
+        </p:nvPicPr>
+        <p:blipFill>
+          <a:blip r:embed="rId2"/>
+          <a:stretch>
+            <a:fillRect/>
+          </a:stretch>
+        </p:blipFill>
+        <p:spPr>
+          <a:xfrm>
+            <a:off x="663169" y="1413369"/>
+            <a:ext cx="6849773" cy="3403165"/>
+          </a:xfrm>
+          <a:prstGeom prst="rect">
+            <a:avLst/>
+          </a:prstGeom>
+        </p:spPr>
+      </p:pic>
+      <mc:AlternateContent xmlns:mc="http://schemas.openxmlformats.org/markup-compatibility/2006" xmlns:a14="http://schemas.microsoft.com/office/drawing/2010/main">
+        <mc:Choice Requires="a14">
+          <p:sp>
+            <p:nvSpPr>
+              <p:cNvPr id="10" name="Title 1"/>
+              <p:cNvSpPr>
+                <a:spLocks noGrp="1"/>
+              </p:cNvSpPr>
+              <p:nvPr>
+                <p:ph type="title"/>
+              </p:nvPr>
+            </p:nvSpPr>
+            <p:spPr>
+              <a:xfrm>
+                <a:off x="838200" y="365125"/>
+                <a:ext cx="10515600" cy="1325563"/>
+              </a:xfrm>
+            </p:spPr>
+            <p:txBody>
+              <a:bodyPr/>
+              <a:lstStyle/>
+              <a:p>
+                <a:pPr/>
+                <a14:m>
+                  <m:oMathPara xmlns:m="http://schemas.openxmlformats.org/officeDocument/2006/math">
+                    <m:oMathParaPr>
+                      <m:jc m:val="left"/>
+                    </m:oMathParaPr>
+                    <m:oMath xmlns:m="http://schemas.openxmlformats.org/officeDocument/2006/math">
+                      <m:r>
+                        <a:rPr lang="en-GB" b="0" i="1" dirty="0" smtClean="0">
+                          <a:latin typeface="Cambria Math" panose="02040503050406030204" pitchFamily="18" charset="0"/>
+                        </a:rPr>
+                        <m:t>𝜃</m:t>
+                      </m:r>
+                      <m:r>
+                        <a:rPr lang="en-GB" b="0" i="1" dirty="0" smtClean="0">
+                          <a:latin typeface="Cambria Math" panose="02040503050406030204" pitchFamily="18" charset="0"/>
+                        </a:rPr>
+                        <m:t>=</m:t>
+                      </m:r>
+                      <m:f>
+                        <m:fPr>
+                          <m:ctrlPr>
+                            <a:rPr lang="en-GB" i="1" dirty="0" smtClean="0">
+                              <a:latin typeface="Cambria Math" panose="02040503050406030204" pitchFamily="18" charset="0"/>
+                            </a:rPr>
+                          </m:ctrlPr>
+                        </m:fPr>
+                        <m:num>
+                          <m:r>
+                            <a:rPr lang="en-GB" b="0" i="1" dirty="0" smtClean="0">
+                              <a:latin typeface="Cambria Math" panose="02040503050406030204" pitchFamily="18" charset="0"/>
+                            </a:rPr>
+                            <m:t>𝜋</m:t>
+                          </m:r>
+                        </m:num>
+                        <m:den>
+                          <m:r>
+                            <a:rPr lang="en-GB" b="0" i="1" dirty="0" smtClean="0">
+                              <a:latin typeface="Cambria Math" panose="02040503050406030204" pitchFamily="18" charset="0"/>
+                            </a:rPr>
+                            <m:t>3</m:t>
+                          </m:r>
+                        </m:den>
+                      </m:f>
+                    </m:oMath>
+                  </m:oMathPara>
+                </a14:m>
+                <a:endParaRPr lang="en-US" dirty="0"/>
+              </a:p>
+            </p:txBody>
+          </p:sp>
+        </mc:Choice>
+        <mc:Fallback xmlns="">
+          <p:sp>
+            <p:nvSpPr>
+              <p:cNvPr id="10" name="Title 1"/>
+              <p:cNvSpPr>
+                <a:spLocks noGrp="1" noRot="1" noChangeAspect="1" noMove="1" noResize="1" noEditPoints="1" noAdjustHandles="1" noChangeArrowheads="1" noChangeShapeType="1" noTextEdit="1"/>
+              </p:cNvSpPr>
+              <p:nvPr>
+                <p:ph type="title"/>
+              </p:nvPr>
+            </p:nvSpPr>
+            <p:spPr>
+              <a:xfrm>
+                <a:off x="838200" y="365125"/>
+                <a:ext cx="10515600" cy="1325563"/>
+              </a:xfrm>
+              <a:blipFill>
+                <a:blip r:embed="rId3"/>
+                <a:stretch>
+                  <a:fillRect/>
+                </a:stretch>
+              </a:blipFill>
+            </p:spPr>
+            <p:txBody>
+              <a:bodyPr/>
+              <a:lstStyle/>
+              <a:p>
+                <a:r>
+                  <a:rPr lang="en-US">
+                    <a:noFill/>
+                  </a:rPr>
+                  <a:t> </a:t>
+                </a:r>
+              </a:p>
+            </p:txBody>
+          </p:sp>
+        </mc:Fallback>
+      </mc:AlternateContent>
+      <p:pic>
+        <p:nvPicPr>
+          <p:cNvPr id="12" name="Picture 11"/>
+          <p:cNvPicPr>
+            <a:picLocks noChangeAspect="1"/>
+          </p:cNvPicPr>
+          <p:nvPr/>
+        </p:nvPicPr>
+        <p:blipFill>
+          <a:blip r:embed="rId4"/>
+          <a:stretch>
+            <a:fillRect/>
+          </a:stretch>
+        </p:blipFill>
+        <p:spPr>
+          <a:xfrm>
+            <a:off x="7619170" y="0"/>
+            <a:ext cx="4572830" cy="3325039"/>
+          </a:xfrm>
+          <a:prstGeom prst="rect">
+            <a:avLst/>
+          </a:prstGeom>
+        </p:spPr>
+      </p:pic>
+      <p:pic>
+        <p:nvPicPr>
+          <p:cNvPr id="13" name="Picture 12"/>
+          <p:cNvPicPr>
+            <a:picLocks noChangeAspect="1"/>
+          </p:cNvPicPr>
+          <p:nvPr/>
+        </p:nvPicPr>
+        <p:blipFill>
+          <a:blip r:embed="rId5"/>
+          <a:stretch>
+            <a:fillRect/>
+          </a:stretch>
+        </p:blipFill>
+        <p:spPr>
+          <a:xfrm>
+            <a:off x="7619170" y="3325040"/>
+            <a:ext cx="4572830" cy="3534230"/>
+          </a:xfrm>
+          <a:prstGeom prst="rect">
+            <a:avLst/>
+          </a:prstGeom>
+        </p:spPr>
+      </p:pic>
+      <mc:AlternateContent xmlns:mc="http://schemas.openxmlformats.org/markup-compatibility/2006" xmlns:a14="http://schemas.microsoft.com/office/drawing/2010/main">
+        <mc:Choice Requires="a14">
+          <p:sp>
+            <p:nvSpPr>
+              <p:cNvPr id="14" name="Content Placeholder 4"/>
+              <p:cNvSpPr txBox="1">
+                <a:spLocks/>
+              </p:cNvSpPr>
+              <p:nvPr/>
+            </p:nvSpPr>
+            <p:spPr>
+              <a:xfrm>
+                <a:off x="838200" y="4678053"/>
+                <a:ext cx="6504709" cy="1498909"/>
+              </a:xfrm>
+              <a:prstGeom prst="rect">
+                <a:avLst/>
+              </a:prstGeom>
+            </p:spPr>
+            <p:txBody>
+              <a:bodyPr vert="horz" lIns="91440" tIns="45720" rIns="91440" bIns="45720" rtlCol="0">
+                <a:normAutofit/>
+              </a:bodyPr>
+              <a:lstStyle>
+                <a:lvl1pPr marL="228600" indent="-228600" algn="l" defTabSz="914400" rtl="0" eaLnBrk="1" latinLnBrk="0" hangingPunct="1">
+                  <a:lnSpc>
+                    <a:spcPct val="90000"/>
+                  </a:lnSpc>
+                  <a:spcBef>
+                    <a:spcPts val="1000"/>
+                  </a:spcBef>
+                  <a:buFont typeface="Arial" panose="020B0604020202020204" pitchFamily="34" charset="0"/>
+                  <a:buChar char="•"/>
+                  <a:defRPr sz="2800" kern="1200">
+                    <a:solidFill>
+                      <a:schemeClr val="tx1"/>
+                    </a:solidFill>
+                    <a:latin typeface="+mn-lt"/>
+                    <a:ea typeface="+mn-ea"/>
+                    <a:cs typeface="+mn-cs"/>
+                  </a:defRPr>
+                </a:lvl1pPr>
+                <a:lvl2pPr marL="685800" indent="-228600" algn="l" defTabSz="914400" rtl="0" eaLnBrk="1" latinLnBrk="0" hangingPunct="1">
+                  <a:lnSpc>
+                    <a:spcPct val="90000"/>
+                  </a:lnSpc>
+                  <a:spcBef>
+                    <a:spcPts val="500"/>
+                  </a:spcBef>
+                  <a:buFont typeface="Arial" panose="020B0604020202020204" pitchFamily="34" charset="0"/>
+                  <a:buChar char="•"/>
+                  <a:defRPr sz="2400" kern="1200">
+                    <a:solidFill>
+                      <a:schemeClr val="tx1"/>
+                    </a:solidFill>
+                    <a:latin typeface="+mn-lt"/>
+                    <a:ea typeface="+mn-ea"/>
+                    <a:cs typeface="+mn-cs"/>
+                  </a:defRPr>
+                </a:lvl2pPr>
+                <a:lvl3pPr marL="1143000" indent="-228600" algn="l" defTabSz="914400" rtl="0" eaLnBrk="1" latinLnBrk="0" hangingPunct="1">
+                  <a:lnSpc>
+                    <a:spcPct val="90000"/>
+                  </a:lnSpc>
+                  <a:spcBef>
+                    <a:spcPts val="500"/>
+                  </a:spcBef>
+                  <a:buFont typeface="Arial" panose="020B0604020202020204" pitchFamily="34" charset="0"/>
+                  <a:buChar char="•"/>
+                  <a:defRPr sz="2000" kern="1200">
+                    <a:solidFill>
+                      <a:schemeClr val="tx1"/>
+                    </a:solidFill>
+                    <a:latin typeface="+mn-lt"/>
+                    <a:ea typeface="+mn-ea"/>
+                    <a:cs typeface="+mn-cs"/>
+                  </a:defRPr>
+                </a:lvl3pPr>
+                <a:lvl4pPr marL="1600200" indent="-228600" algn="l" defTabSz="914400" rtl="0" eaLnBrk="1" latinLnBrk="0" hangingPunct="1">
+                  <a:lnSpc>
+                    <a:spcPct val="90000"/>
+                  </a:lnSpc>
+                  <a:spcBef>
+                    <a:spcPts val="500"/>
+                  </a:spcBef>
+                  <a:buFont typeface="Arial" panose="020B0604020202020204" pitchFamily="34" charset="0"/>
+                  <a:buChar char="•"/>
+                  <a:defRPr sz="1800" kern="1200">
+                    <a:solidFill>
+                      <a:schemeClr val="tx1"/>
+                    </a:solidFill>
+                    <a:latin typeface="+mn-lt"/>
+                    <a:ea typeface="+mn-ea"/>
+                    <a:cs typeface="+mn-cs"/>
+                  </a:defRPr>
+                </a:lvl4pPr>
+                <a:lvl5pPr marL="2057400" indent="-228600" algn="l" defTabSz="914400" rtl="0" eaLnBrk="1" latinLnBrk="0" hangingPunct="1">
+                  <a:lnSpc>
+                    <a:spcPct val="90000"/>
+                  </a:lnSpc>
+                  <a:spcBef>
+                    <a:spcPts val="500"/>
+                  </a:spcBef>
+                  <a:buFont typeface="Arial" panose="020B0604020202020204" pitchFamily="34" charset="0"/>
+                  <a:buChar char="•"/>
+                  <a:defRPr sz="1800" kern="1200">
+                    <a:solidFill>
+                      <a:schemeClr val="tx1"/>
+                    </a:solidFill>
+                    <a:latin typeface="+mn-lt"/>
+                    <a:ea typeface="+mn-ea"/>
+                    <a:cs typeface="+mn-cs"/>
+                  </a:defRPr>
+                </a:lvl5pPr>
+                <a:lvl6pPr marL="2514600" indent="-228600" algn="l" defTabSz="914400" rtl="0" eaLnBrk="1" latinLnBrk="0" hangingPunct="1">
+                  <a:lnSpc>
+                    <a:spcPct val="90000"/>
+                  </a:lnSpc>
+                  <a:spcBef>
+                    <a:spcPts val="500"/>
+                  </a:spcBef>
+                  <a:buFont typeface="Arial" panose="020B0604020202020204" pitchFamily="34" charset="0"/>
+                  <a:buChar char="•"/>
+                  <a:defRPr sz="1800" kern="1200">
+                    <a:solidFill>
+                      <a:schemeClr val="tx1"/>
+                    </a:solidFill>
+                    <a:latin typeface="+mn-lt"/>
+                    <a:ea typeface="+mn-ea"/>
+                    <a:cs typeface="+mn-cs"/>
+                  </a:defRPr>
+                </a:lvl6pPr>
+                <a:lvl7pPr marL="2971800" indent="-228600" algn="l" defTabSz="914400" rtl="0" eaLnBrk="1" latinLnBrk="0" hangingPunct="1">
+                  <a:lnSpc>
+                    <a:spcPct val="90000"/>
+                  </a:lnSpc>
+                  <a:spcBef>
+                    <a:spcPts val="500"/>
+                  </a:spcBef>
+                  <a:buFont typeface="Arial" panose="020B0604020202020204" pitchFamily="34" charset="0"/>
+                  <a:buChar char="•"/>
+                  <a:defRPr sz="1800" kern="1200">
+                    <a:solidFill>
+                      <a:schemeClr val="tx1"/>
+                    </a:solidFill>
+                    <a:latin typeface="+mn-lt"/>
+                    <a:ea typeface="+mn-ea"/>
+                    <a:cs typeface="+mn-cs"/>
+                  </a:defRPr>
+                </a:lvl7pPr>
+                <a:lvl8pPr marL="3429000" indent="-228600" algn="l" defTabSz="914400" rtl="0" eaLnBrk="1" latinLnBrk="0" hangingPunct="1">
+                  <a:lnSpc>
+                    <a:spcPct val="90000"/>
+                  </a:lnSpc>
+                  <a:spcBef>
+                    <a:spcPts val="500"/>
+                  </a:spcBef>
+                  <a:buFont typeface="Arial" panose="020B0604020202020204" pitchFamily="34" charset="0"/>
+                  <a:buChar char="•"/>
+                  <a:defRPr sz="1800" kern="1200">
+                    <a:solidFill>
+                      <a:schemeClr val="tx1"/>
+                    </a:solidFill>
+                    <a:latin typeface="+mn-lt"/>
+                    <a:ea typeface="+mn-ea"/>
+                    <a:cs typeface="+mn-cs"/>
+                  </a:defRPr>
+                </a:lvl8pPr>
+                <a:lvl9pPr marL="3886200" indent="-228600" algn="l" defTabSz="914400" rtl="0" eaLnBrk="1" latinLnBrk="0" hangingPunct="1">
+                  <a:lnSpc>
+                    <a:spcPct val="90000"/>
+                  </a:lnSpc>
+                  <a:spcBef>
+                    <a:spcPts val="500"/>
+                  </a:spcBef>
+                  <a:buFont typeface="Arial" panose="020B0604020202020204" pitchFamily="34" charset="0"/>
+                  <a:buChar char="•"/>
+                  <a:defRPr sz="1800" kern="1200">
+                    <a:solidFill>
+                      <a:schemeClr val="tx1"/>
+                    </a:solidFill>
+                    <a:latin typeface="+mn-lt"/>
+                    <a:ea typeface="+mn-ea"/>
+                    <a:cs typeface="+mn-cs"/>
+                  </a:defRPr>
+                </a:lvl9pPr>
+              </a:lstStyle>
+              <a:p>
+                <a:pPr marL="0" indent="0">
+                  <a:buNone/>
+                </a:pPr>
+                <a14:m>
+                  <m:oMathPara xmlns:m="http://schemas.openxmlformats.org/officeDocument/2006/math">
+                    <m:oMathParaPr>
+                      <m:jc m:val="centerGroup"/>
+                    </m:oMathParaPr>
+                    <m:oMath xmlns:m="http://schemas.openxmlformats.org/officeDocument/2006/math">
+                      <m:r>
+                        <a:rPr lang="en-GB" i="1" smtClean="0">
+                          <a:latin typeface="Cambria Math" panose="02040503050406030204" pitchFamily="18" charset="0"/>
+                        </a:rPr>
+                        <m:t>𝛾</m:t>
+                      </m:r>
+                      <m:r>
+                        <a:rPr lang="en-GB" i="1" smtClean="0">
+                          <a:latin typeface="Cambria Math" panose="02040503050406030204" pitchFamily="18" charset="0"/>
+                        </a:rPr>
+                        <m:t>=7×</m:t>
+                      </m:r>
+                      <m:sSup>
+                        <m:sSupPr>
+                          <m:ctrlPr>
+                            <a:rPr lang="en-GB" i="1" smtClean="0">
+                              <a:latin typeface="Cambria Math" panose="02040503050406030204" pitchFamily="18" charset="0"/>
+                            </a:rPr>
+                          </m:ctrlPr>
+                        </m:sSupPr>
+                        <m:e>
+                          <m:r>
+                            <a:rPr lang="en-GB" i="1" smtClean="0">
+                              <a:latin typeface="Cambria Math" panose="02040503050406030204" pitchFamily="18" charset="0"/>
+                            </a:rPr>
+                            <m:t>10</m:t>
+                          </m:r>
+                        </m:e>
+                        <m:sup>
+                          <m:r>
+                            <a:rPr lang="en-GB" i="1" smtClean="0">
+                              <a:latin typeface="Cambria Math" panose="02040503050406030204" pitchFamily="18" charset="0"/>
+                            </a:rPr>
+                            <m:t>−2</m:t>
+                          </m:r>
+                        </m:sup>
+                      </m:sSup>
+                      <m:r>
+                        <a:rPr lang="en-GB" b="0" i="0" smtClean="0">
+                          <a:latin typeface="Cambria Math" panose="02040503050406030204" pitchFamily="18" charset="0"/>
+                        </a:rPr>
+                        <m:t> </m:t>
+                      </m:r>
+                      <m:r>
+                        <m:rPr>
+                          <m:sty m:val="p"/>
+                        </m:rPr>
+                        <a:rPr lang="en-GB">
+                          <a:latin typeface="Cambria Math" panose="02040503050406030204" pitchFamily="18" charset="0"/>
+                        </a:rPr>
+                        <m:t>N</m:t>
+                      </m:r>
+                      <m:r>
+                        <a:rPr lang="en-GB">
+                          <a:latin typeface="Cambria Math" panose="02040503050406030204" pitchFamily="18" charset="0"/>
+                        </a:rPr>
+                        <m:t>/</m:t>
+                      </m:r>
+                      <m:r>
+                        <m:rPr>
+                          <m:sty m:val="p"/>
+                        </m:rPr>
+                        <a:rPr lang="en-GB">
+                          <a:latin typeface="Cambria Math" panose="02040503050406030204" pitchFamily="18" charset="0"/>
+                        </a:rPr>
+                        <m:t>m</m:t>
+                      </m:r>
+                    </m:oMath>
+                  </m:oMathPara>
+                </a14:m>
+                <a:endParaRPr lang="en-US" dirty="0"/>
+              </a:p>
+            </p:txBody>
+          </p:sp>
+        </mc:Choice>
+        <mc:Fallback xmlns="">
+          <p:sp>
+            <p:nvSpPr>
+              <p:cNvPr id="14" name="Content Placeholder 4"/>
+              <p:cNvSpPr txBox="1">
+                <a:spLocks noRot="1" noChangeAspect="1" noMove="1" noResize="1" noEditPoints="1" noAdjustHandles="1" noChangeArrowheads="1" noChangeShapeType="1" noTextEdit="1"/>
+              </p:cNvSpPr>
+              <p:nvPr/>
+            </p:nvSpPr>
+            <p:spPr>
+              <a:xfrm>
+                <a:off x="838200" y="4678053"/>
+                <a:ext cx="6504709" cy="1498909"/>
+              </a:xfrm>
+              <a:prstGeom prst="rect">
+                <a:avLst/>
+              </a:prstGeom>
+              <a:blipFill>
+                <a:blip r:embed="rId6"/>
+                <a:stretch>
+                  <a:fillRect/>
+                </a:stretch>
+              </a:blipFill>
+            </p:spPr>
+            <p:txBody>
+              <a:bodyPr/>
+              <a:lstStyle/>
+              <a:p>
+                <a:r>
+                  <a:rPr lang="en-US">
+                    <a:noFill/>
+                  </a:rPr>
+                  <a:t> </a:t>
+                </a:r>
+              </a:p>
+            </p:txBody>
+          </p:sp>
+        </mc:Fallback>
+      </mc:AlternateContent>
+    </p:spTree>
+    <p:extLst>
+      <p:ext uri="{BB962C8B-B14F-4D97-AF65-F5344CB8AC3E}">
+        <p14:creationId xmlns:p14="http://schemas.microsoft.com/office/powerpoint/2010/main" val="2766400791"/>
+      </p:ext>
+    </p:extLst>
+  </p:cSld>
+  <p:clrMapOvr>
+    <a:masterClrMapping/>
+  </p:clrMapOvr>
 </p:sld>
 </file>
 
@@ -6702,76 +7005,16 @@
         <a:srgbClr val="954F72"/>
       </a:folHlink>
     </a:clrScheme>
-    <a:fontScheme name="Candara">
+    <a:fontScheme name="Custom 1">
       <a:majorFont>
-        <a:latin typeface="Candara" panose="020E0502030303020204"/>
+        <a:latin typeface="Constantia"/>
         <a:ea typeface=""/>
         <a:cs typeface=""/>
-        <a:font script="Jpan" typeface="HGｺﾞｼｯｸM"/>
-        <a:font script="Hang" typeface="HY엽서L"/>
-        <a:font script="Hans" typeface="华文楷体"/>
-        <a:font script="Hant" typeface="新細明體"/>
-        <a:font script="Arab" typeface="Tahoma"/>
-        <a:font script="Hebr" typeface="Miriam"/>
-        <a:font script="Thai" typeface="DilleniaUPC"/>
-        <a:font script="Ethi" typeface="Nyala"/>
-        <a:font script="Beng" typeface="Vrinda"/>
-        <a:font script="Gujr" typeface="Shruti"/>
-        <a:font script="Khmr" typeface="DaunPenh"/>
-        <a:font script="Knda" typeface="Tunga"/>
-        <a:font script="Guru" typeface="Raavi"/>
-        <a:font script="Cans" typeface="Euphemia"/>
-        <a:font script="Cher" typeface="Plantagenet Cherokee"/>
-        <a:font script="Yiii" typeface="Microsoft Yi Baiti"/>
-        <a:font script="Tibt" typeface="Microsoft Himalaya"/>
-        <a:font script="Thaa" typeface="MV Boli"/>
-        <a:font script="Deva" typeface="Mangal"/>
-        <a:font script="Telu" typeface="Gautami"/>
-        <a:font script="Taml" typeface="Latha"/>
-        <a:font script="Syrc" typeface="Estrangelo Edessa"/>
-        <a:font script="Orya" typeface="Kalinga"/>
-        <a:font script="Mlym" typeface="Kartika"/>
-        <a:font script="Laoo" typeface="DokChampa"/>
-        <a:font script="Sinh" typeface="Iskoola Pota"/>
-        <a:font script="Mong" typeface="Mongolian Baiti"/>
-        <a:font script="Viet" typeface="Arial"/>
-        <a:font script="Uigh" typeface="Microsoft Uighur"/>
-        <a:font script="Geor" typeface="Sylfaen"/>
       </a:majorFont>
       <a:minorFont>
-        <a:latin typeface="Candara" panose="020E0502030303020204"/>
+        <a:latin typeface="Constantia"/>
         <a:ea typeface=""/>
         <a:cs typeface=""/>
-        <a:font script="Jpan" typeface="HGｺﾞｼｯｸM"/>
-        <a:font script="Hang" typeface="HY엽서L"/>
-        <a:font script="Hans" typeface="华文楷体"/>
-        <a:font script="Hant" typeface="新細明體"/>
-        <a:font script="Arab" typeface="Tahoma"/>
-        <a:font script="Hebr" typeface="Miriam"/>
-        <a:font script="Thai" typeface="DilleniaUPC"/>
-        <a:font script="Ethi" typeface="Nyala"/>
-        <a:font script="Beng" typeface="Vrinda"/>
-        <a:font script="Gujr" typeface="Shruti"/>
-        <a:font script="Khmr" typeface="DaunPenh"/>
-        <a:font script="Knda" typeface="Tunga"/>
-        <a:font script="Guru" typeface="Raavi"/>
-        <a:font script="Cans" typeface="Euphemia"/>
-        <a:font script="Cher" typeface="Plantagenet Cherokee"/>
-        <a:font script="Yiii" typeface="Microsoft Yi Baiti"/>
-        <a:font script="Tibt" typeface="Microsoft Himalaya"/>
-        <a:font script="Thaa" typeface="MV Boli"/>
-        <a:font script="Deva" typeface="Mangal"/>
-        <a:font script="Telu" typeface="Gautami"/>
-        <a:font script="Taml" typeface="Latha"/>
-        <a:font script="Syrc" typeface="Estrangelo Edessa"/>
-        <a:font script="Orya" typeface="Kalinga"/>
-        <a:font script="Mlym" typeface="Kartika"/>
-        <a:font script="Laoo" typeface="DokChampa"/>
-        <a:font script="Sinh" typeface="Iskoola Pota"/>
-        <a:font script="Mong" typeface="Mongolian Baiti"/>
-        <a:font script="Viet" typeface="Arial"/>
-        <a:font script="Uigh" typeface="Microsoft Uighur"/>
-        <a:font script="Geor" typeface="Sylfaen"/>
       </a:minorFont>
     </a:fontScheme>
     <a:fmtScheme name="Office">

</xml_diff>